<commit_message>
add sequence diagram for add-medical-history command
</commit_message>
<xml_diff>
--- a/docs/diagrams/LogicComponentSequenceDiagram.pptx
+++ b/docs/diagrams/LogicComponentSequenceDiagram.pptx
@@ -8,7 +8,7 @@
     <p:notesMasterId r:id="rId3"/>
   </p:notesMasterIdLst>
   <p:sldIdLst>
-    <p:sldId id="267" r:id="rId2"/>
+    <p:sldId id="268" r:id="rId2"/>
   </p:sldIdLst>
   <p:sldSz cx="9144000" cy="6858000" type="screen4x3"/>
   <p:notesSz cx="6858000" cy="9144000"/>
@@ -126,10 +126,6 @@
 </p:presentation>
 </file>
 
-<file path=ppt/revisionInfo.xml><?xml version="1.0" encoding="utf-8"?>
-<p1510:revInfo xmlns:a="http://schemas.openxmlformats.org/drawingml/2006/main" xmlns:r="http://schemas.openxmlformats.org/officeDocument/2006/relationships" xmlns:p1510="http://schemas.microsoft.com/office/powerpoint/2015/10/main"/>
-</file>
-
 <file path=ppt/notesMasters/notesMaster1.xml><?xml version="1.0" encoding="utf-8"?>
 <p:notesMaster xmlns:a="http://schemas.openxmlformats.org/drawingml/2006/main" xmlns:r="http://schemas.openxmlformats.org/officeDocument/2006/relationships" xmlns:p="http://schemas.openxmlformats.org/presentationml/2006/main">
   <p:cSld>
@@ -212,7 +208,7 @@
           <a:p>
             <a:fld id="{F5CC4B3F-88C1-4FFA-B1B6-F41C21DC6924}" type="datetimeFigureOut">
               <a:rPr lang="en-US" smtClean="0"/>
-              <a:t>7/11/2017</a:t>
+              <a:t>10/24/18</a:t>
             </a:fld>
             <a:endParaRPr lang="en-US"/>
           </a:p>
@@ -658,7 +654,7 @@
           <a:p>
             <a:fld id="{78C97017-6FC3-485B-9764-EAC9E56C1D49}" type="datetimeFigureOut">
               <a:rPr lang="en-US" smtClean="0"/>
-              <a:t>7/11/2017</a:t>
+              <a:t>10/24/18</a:t>
             </a:fld>
             <a:endParaRPr lang="en-US"/>
           </a:p>
@@ -826,7 +822,7 @@
           <a:p>
             <a:fld id="{78C97017-6FC3-485B-9764-EAC9E56C1D49}" type="datetimeFigureOut">
               <a:rPr lang="en-US" smtClean="0"/>
-              <a:t>7/11/2017</a:t>
+              <a:t>10/24/18</a:t>
             </a:fld>
             <a:endParaRPr lang="en-US"/>
           </a:p>
@@ -1004,7 +1000,7 @@
           <a:p>
             <a:fld id="{78C97017-6FC3-485B-9764-EAC9E56C1D49}" type="datetimeFigureOut">
               <a:rPr lang="en-US" smtClean="0"/>
-              <a:t>7/11/2017</a:t>
+              <a:t>10/24/18</a:t>
             </a:fld>
             <a:endParaRPr lang="en-US"/>
           </a:p>
@@ -1172,7 +1168,7 @@
           <a:p>
             <a:fld id="{78C97017-6FC3-485B-9764-EAC9E56C1D49}" type="datetimeFigureOut">
               <a:rPr lang="en-US" smtClean="0"/>
-              <a:t>7/11/2017</a:t>
+              <a:t>10/24/18</a:t>
             </a:fld>
             <a:endParaRPr lang="en-US"/>
           </a:p>
@@ -1417,7 +1413,7 @@
           <a:p>
             <a:fld id="{78C97017-6FC3-485B-9764-EAC9E56C1D49}" type="datetimeFigureOut">
               <a:rPr lang="en-US" smtClean="0"/>
-              <a:t>7/11/2017</a:t>
+              <a:t>10/24/18</a:t>
             </a:fld>
             <a:endParaRPr lang="en-US"/>
           </a:p>
@@ -1702,7 +1698,7 @@
           <a:p>
             <a:fld id="{78C97017-6FC3-485B-9764-EAC9E56C1D49}" type="datetimeFigureOut">
               <a:rPr lang="en-US" smtClean="0"/>
-              <a:t>7/11/2017</a:t>
+              <a:t>10/24/18</a:t>
             </a:fld>
             <a:endParaRPr lang="en-US"/>
           </a:p>
@@ -2121,7 +2117,7 @@
           <a:p>
             <a:fld id="{78C97017-6FC3-485B-9764-EAC9E56C1D49}" type="datetimeFigureOut">
               <a:rPr lang="en-US" smtClean="0"/>
-              <a:t>7/11/2017</a:t>
+              <a:t>10/24/18</a:t>
             </a:fld>
             <a:endParaRPr lang="en-US"/>
           </a:p>
@@ -2238,7 +2234,7 @@
           <a:p>
             <a:fld id="{78C97017-6FC3-485B-9764-EAC9E56C1D49}" type="datetimeFigureOut">
               <a:rPr lang="en-US" smtClean="0"/>
-              <a:t>7/11/2017</a:t>
+              <a:t>10/24/18</a:t>
             </a:fld>
             <a:endParaRPr lang="en-US"/>
           </a:p>
@@ -2333,7 +2329,7 @@
           <a:p>
             <a:fld id="{78C97017-6FC3-485B-9764-EAC9E56C1D49}" type="datetimeFigureOut">
               <a:rPr lang="en-US" smtClean="0"/>
-              <a:t>7/11/2017</a:t>
+              <a:t>10/24/18</a:t>
             </a:fld>
             <a:endParaRPr lang="en-US"/>
           </a:p>
@@ -2608,7 +2604,7 @@
           <a:p>
             <a:fld id="{78C97017-6FC3-485B-9764-EAC9E56C1D49}" type="datetimeFigureOut">
               <a:rPr lang="en-US" smtClean="0"/>
-              <a:t>7/11/2017</a:t>
+              <a:t>10/24/18</a:t>
             </a:fld>
             <a:endParaRPr lang="en-US"/>
           </a:p>
@@ -2860,7 +2856,7 @@
           <a:p>
             <a:fld id="{78C97017-6FC3-485B-9764-EAC9E56C1D49}" type="datetimeFigureOut">
               <a:rPr lang="en-US" smtClean="0"/>
-              <a:t>7/11/2017</a:t>
+              <a:t>10/24/18</a:t>
             </a:fld>
             <a:endParaRPr lang="en-US"/>
           </a:p>
@@ -3071,7 +3067,7 @@
           <a:p>
             <a:fld id="{78C97017-6FC3-485B-9764-EAC9E56C1D49}" type="datetimeFigureOut">
               <a:rPr lang="en-US" smtClean="0"/>
-              <a:t>7/11/2017</a:t>
+              <a:t>10/24/18</a:t>
             </a:fld>
             <a:endParaRPr lang="en-US"/>
           </a:p>
@@ -3448,14 +3444,76 @@
       </p:grpSpPr>
       <p:sp>
         <p:nvSpPr>
+          <p:cNvPr id="66" name="Rectangle 65">
+            <a:extLst>
+              <a:ext uri="{FF2B5EF4-FFF2-40B4-BE49-F238E27FC236}">
+                <a16:creationId xmlns:a16="http://schemas.microsoft.com/office/drawing/2014/main" id="{977AFC49-CE5E-FB4D-8347-107895882ED4}"/>
+              </a:ext>
+            </a:extLst>
+          </p:cNvPr>
+          <p:cNvSpPr/>
+          <p:nvPr/>
+        </p:nvSpPr>
+        <p:spPr>
+          <a:xfrm>
+            <a:off x="5856199" y="1740137"/>
+            <a:ext cx="3206009" cy="3567874"/>
+          </a:xfrm>
+          <a:prstGeom prst="roundRect">
+            <a:avLst>
+              <a:gd name="adj" fmla="val 3484"/>
+            </a:avLst>
+          </a:prstGeom>
+          <a:solidFill>
+            <a:schemeClr val="accent4">
+              <a:lumMod val="20000"/>
+              <a:lumOff val="80000"/>
+            </a:schemeClr>
+          </a:solidFill>
+          <a:ln w="19050">
+            <a:noFill/>
+          </a:ln>
+          <a:effectLst/>
+        </p:spPr>
+        <p:style>
+          <a:lnRef idx="1">
+            <a:schemeClr val="accent2"/>
+          </a:lnRef>
+          <a:fillRef idx="2">
+            <a:schemeClr val="accent2"/>
+          </a:fillRef>
+          <a:effectRef idx="1">
+            <a:schemeClr val="accent2"/>
+          </a:effectRef>
+          <a:fontRef idx="minor">
+            <a:schemeClr val="dk1"/>
+          </a:fontRef>
+        </p:style>
+        <p:txBody>
+          <a:bodyPr rtlCol="0" anchor="t"/>
+          <a:lstStyle/>
+          <a:p>
+            <a:r>
+              <a:rPr lang="en-SG" sz="1000" b="1" dirty="0">
+                <a:solidFill>
+                  <a:srgbClr val="7030A0"/>
+                </a:solidFill>
+              </a:rPr>
+              <a:t>Model</a:t>
+            </a:r>
+          </a:p>
+        </p:txBody>
+      </p:sp>
+      <p:sp>
+        <p:nvSpPr>
           <p:cNvPr id="81" name="Rectangle 65"/>
           <p:cNvSpPr/>
           <p:nvPr/>
         </p:nvSpPr>
         <p:spPr>
           <a:xfrm>
-            <a:off x="685800" y="1981200"/>
-            <a:ext cx="7252956" cy="4000286"/>
+            <a:off x="31783" y="1740138"/>
+            <a:ext cx="5867034" cy="3584374"/>
           </a:xfrm>
           <a:prstGeom prst="roundRect">
             <a:avLst>
@@ -3492,14 +3550,14 @@
           <a:lstStyle/>
           <a:p>
             <a:r>
-              <a:rPr lang="en-US" sz="1200" b="1" dirty="0">
+              <a:rPr lang="en-US" sz="1000" b="1" dirty="0">
                 <a:solidFill>
                   <a:srgbClr val="0070C0"/>
                 </a:solidFill>
               </a:rPr>
               <a:t>Logic</a:t>
             </a:r>
-            <a:endParaRPr lang="en-SG" sz="1200" b="1" dirty="0">
+            <a:endParaRPr lang="en-SG" sz="1000" b="1" dirty="0">
               <a:solidFill>
                 <a:srgbClr val="0070C0"/>
               </a:solidFill>
@@ -3515,8 +3573,8 @@
         </p:nvSpPr>
         <p:spPr>
           <a:xfrm>
-            <a:off x="845045" y="2296546"/>
-            <a:ext cx="1455629" cy="346760"/>
+            <a:off x="454201" y="1970933"/>
+            <a:ext cx="1140887" cy="249316"/>
           </a:xfrm>
           <a:prstGeom prst="rect">
             <a:avLst/>
@@ -3551,7 +3609,7 @@
           <a:p>
             <a:pPr algn="ctr"/>
             <a:r>
-              <a:rPr lang="en-US" sz="1600" dirty="0">
+              <a:rPr lang="en-US" sz="1200" dirty="0">
                 <a:solidFill>
                   <a:schemeClr val="bg1"/>
                 </a:solidFill>
@@ -3559,14 +3617,14 @@
               <a:t>:</a:t>
             </a:r>
             <a:r>
-              <a:rPr lang="en-US" sz="1600" dirty="0" err="1">
+              <a:rPr lang="en-US" sz="1200" dirty="0" err="1">
                 <a:solidFill>
                   <a:schemeClr val="bg1"/>
                 </a:solidFill>
               </a:rPr>
               <a:t>LogicManager</a:t>
             </a:r>
-            <a:endParaRPr lang="en-SG" sz="1600" dirty="0">
+            <a:endParaRPr lang="en-SG" sz="1200" dirty="0">
               <a:solidFill>
                 <a:schemeClr val="bg1"/>
               </a:solidFill>
@@ -3577,13 +3635,15 @@
       <p:cxnSp>
         <p:nvCxnSpPr>
           <p:cNvPr id="5" name="Straight Connector 4"/>
-          <p:cNvCxnSpPr/>
+          <p:cNvCxnSpPr>
+            <a:cxnSpLocks/>
+          </p:cNvCxnSpPr>
           <p:nvPr/>
         </p:nvCxnSpPr>
         <p:spPr>
           <a:xfrm>
-            <a:off x="1572859" y="2660217"/>
-            <a:ext cx="0" cy="2597583"/>
+            <a:off x="1095369" y="2220249"/>
+            <a:ext cx="0" cy="2556942"/>
           </a:xfrm>
           <a:prstGeom prst="line">
             <a:avLst/>
@@ -3619,8 +3679,8 @@
         </p:nvSpPr>
         <p:spPr>
           <a:xfrm>
-            <a:off x="1500851" y="3010911"/>
-            <a:ext cx="152400" cy="2780287"/>
+            <a:off x="1017600" y="2475037"/>
+            <a:ext cx="129425" cy="2832974"/>
           </a:xfrm>
           <a:prstGeom prst="rect">
             <a:avLst/>
@@ -3666,8 +3726,8 @@
         </p:nvSpPr>
         <p:spPr>
           <a:xfrm>
-            <a:off x="2743200" y="2179309"/>
-            <a:ext cx="1219200" cy="467684"/>
+            <a:off x="1959402" y="1893715"/>
+            <a:ext cx="914400" cy="376872"/>
           </a:xfrm>
           <a:prstGeom prst="rect">
             <a:avLst/>
@@ -3702,7 +3762,7 @@
           <a:p>
             <a:pPr algn="ctr"/>
             <a:r>
-              <a:rPr lang="en-US" sz="1600" dirty="0">
+              <a:rPr lang="en-US" sz="1200" dirty="0">
                 <a:solidFill>
                   <a:schemeClr val="bg1"/>
                 </a:solidFill>
@@ -3713,14 +3773,14 @@
           <a:p>
             <a:pPr algn="ctr"/>
             <a:r>
-              <a:rPr lang="en-US" sz="1600" dirty="0" err="1">
+              <a:rPr lang="en-US" sz="1200" dirty="0" err="1">
                 <a:solidFill>
                   <a:schemeClr val="bg1"/>
                 </a:solidFill>
               </a:rPr>
               <a:t>BookParser</a:t>
             </a:r>
-            <a:endParaRPr lang="en-SG" sz="1600" dirty="0">
+            <a:endParaRPr lang="en-SG" sz="1200" dirty="0">
               <a:solidFill>
                 <a:schemeClr val="bg1"/>
               </a:solidFill>
@@ -3731,13 +3791,15 @@
       <p:cxnSp>
         <p:nvCxnSpPr>
           <p:cNvPr id="17" name="Straight Connector 16"/>
-          <p:cNvCxnSpPr/>
+          <p:cNvCxnSpPr>
+            <a:cxnSpLocks/>
+          </p:cNvCxnSpPr>
           <p:nvPr/>
         </p:nvCxnSpPr>
         <p:spPr>
           <a:xfrm>
-            <a:off x="3356599" y="2663904"/>
-            <a:ext cx="0" cy="1695374"/>
+            <a:off x="2405314" y="2270587"/>
+            <a:ext cx="0" cy="1594592"/>
           </a:xfrm>
           <a:prstGeom prst="line">
             <a:avLst/>
@@ -3773,7 +3835,7 @@
         </p:nvSpPr>
         <p:spPr>
           <a:xfrm>
-            <a:off x="3284590" y="3122096"/>
+            <a:off x="2329138" y="2642983"/>
             <a:ext cx="174929" cy="1129459"/>
           </a:xfrm>
           <a:prstGeom prst="rect">
@@ -3824,8 +3886,8 @@
         </p:nvSpPr>
         <p:spPr>
           <a:xfrm>
-            <a:off x="6221565" y="3312740"/>
-            <a:ext cx="1093635" cy="461538"/>
+            <a:off x="4628203" y="2697038"/>
+            <a:ext cx="856850" cy="519412"/>
           </a:xfrm>
           <a:prstGeom prst="rect">
             <a:avLst/>
@@ -3860,29 +3922,29 @@
           <a:p>
             <a:pPr algn="ctr"/>
             <a:r>
-              <a:rPr lang="en-US" sz="1600" dirty="0">
+              <a:rPr lang="en-US" sz="1200" dirty="0" err="1">
                 <a:solidFill>
                   <a:schemeClr val="bg1"/>
                 </a:solidFill>
               </a:rPr>
-              <a:t>d:Delete</a:t>
+              <a:t>d:AddMedicalHistory</a:t>
             </a:r>
             <a:br>
-              <a:rPr lang="en-US" sz="1600" dirty="0">
+              <a:rPr lang="en-US" sz="1200" dirty="0">
                 <a:solidFill>
                   <a:schemeClr val="bg1"/>
                 </a:solidFill>
               </a:rPr>
             </a:br>
             <a:r>
-              <a:rPr lang="en-US" sz="1600" dirty="0">
+              <a:rPr lang="en-US" sz="1200" dirty="0">
                 <a:solidFill>
                   <a:schemeClr val="bg1"/>
                 </a:solidFill>
               </a:rPr>
               <a:t>Command</a:t>
             </a:r>
-            <a:endParaRPr lang="en-SG" sz="1600" dirty="0">
+            <a:endParaRPr lang="en-SG" sz="1200" dirty="0">
               <a:solidFill>
                 <a:schemeClr val="bg1"/>
               </a:solidFill>
@@ -3894,14 +3956,15 @@
         <p:nvCxnSpPr>
           <p:cNvPr id="20" name="Straight Connector 19"/>
           <p:cNvCxnSpPr>
+            <a:cxnSpLocks/>
             <a:stCxn id="21" idx="0"/>
           </p:cNvCxnSpPr>
           <p:nvPr/>
         </p:nvCxnSpPr>
         <p:spPr>
           <a:xfrm>
-            <a:off x="6772574" y="3774278"/>
-            <a:ext cx="0" cy="1940722"/>
+            <a:off x="5027536" y="3237231"/>
+            <a:ext cx="30355" cy="2070780"/>
           </a:xfrm>
           <a:prstGeom prst="line">
             <a:avLst/>
@@ -3937,8 +4000,8 @@
         </p:nvSpPr>
         <p:spPr>
           <a:xfrm>
-            <a:off x="6696374" y="3774278"/>
-            <a:ext cx="152400" cy="276003"/>
+            <a:off x="4974834" y="3237231"/>
+            <a:ext cx="105404" cy="225927"/>
           </a:xfrm>
           <a:prstGeom prst="rect">
             <a:avLst/>
@@ -3979,13 +4042,15 @@
       <p:cxnSp>
         <p:nvCxnSpPr>
           <p:cNvPr id="23" name="Straight Arrow Connector 22"/>
-          <p:cNvCxnSpPr/>
+          <p:cNvCxnSpPr>
+            <a:cxnSpLocks/>
+          </p:cNvCxnSpPr>
           <p:nvPr/>
         </p:nvCxnSpPr>
         <p:spPr>
           <a:xfrm>
-            <a:off x="381000" y="3014599"/>
-            <a:ext cx="1119851" cy="0"/>
+            <a:off x="11690" y="2475036"/>
+            <a:ext cx="1017265" cy="0"/>
           </a:xfrm>
           <a:prstGeom prst="straightConnector1">
             <a:avLst/>
@@ -4015,13 +4080,15 @@
       <p:cxnSp>
         <p:nvCxnSpPr>
           <p:cNvPr id="25" name="Straight Arrow Connector 24"/>
-          <p:cNvCxnSpPr/>
+          <p:cNvCxnSpPr>
+            <a:cxnSpLocks/>
+          </p:cNvCxnSpPr>
           <p:nvPr/>
         </p:nvCxnSpPr>
         <p:spPr>
-          <a:xfrm flipV="1">
-            <a:off x="1653251" y="3122097"/>
-            <a:ext cx="1596514" cy="1"/>
+          <a:xfrm>
+            <a:off x="1177443" y="2688568"/>
+            <a:ext cx="1163297" cy="1"/>
           </a:xfrm>
           <a:prstGeom prst="straightConnector1">
             <a:avLst/>
@@ -4056,8 +4123,8 @@
         </p:nvSpPr>
         <p:spPr>
           <a:xfrm>
-            <a:off x="0" y="2743200"/>
-            <a:ext cx="1424846" cy="215444"/>
+            <a:off x="-18663" y="2546133"/>
+            <a:ext cx="1028758" cy="415498"/>
           </a:xfrm>
           <a:prstGeom prst="rect">
             <a:avLst/>
@@ -4072,12 +4139,58 @@
           <a:p>
             <a:pPr algn="r"/>
             <a:r>
-              <a:rPr lang="en-US" sz="1400" dirty="0">
+              <a:rPr lang="en-US" sz="900" dirty="0">
                 <a:solidFill>
                   <a:srgbClr val="0070C0"/>
                 </a:solidFill>
               </a:rPr>
-              <a:t>execute(“delete 1”)</a:t>
+              <a:t>execute</a:t>
+            </a:r>
+          </a:p>
+          <a:p>
+            <a:pPr algn="r"/>
+            <a:r>
+              <a:rPr lang="en-US" sz="900" dirty="0">
+                <a:solidFill>
+                  <a:srgbClr val="0070C0"/>
+                </a:solidFill>
+              </a:rPr>
+              <a:t>(“add-medical-history</a:t>
+            </a:r>
+          </a:p>
+          <a:p>
+            <a:pPr algn="r"/>
+            <a:r>
+              <a:rPr lang="en-US" altLang="zh-Hans" sz="900" dirty="0">
+                <a:solidFill>
+                  <a:srgbClr val="0070C0"/>
+                </a:solidFill>
+              </a:rPr>
+              <a:t>1</a:t>
+            </a:r>
+            <a:r>
+              <a:rPr lang="zh-Hans" altLang="en-US" sz="900" dirty="0">
+                <a:solidFill>
+                  <a:srgbClr val="0070C0"/>
+                </a:solidFill>
+              </a:rPr>
+              <a:t> </a:t>
+            </a:r>
+            <a:r>
+              <a:rPr lang="en-US" altLang="zh-Hans" sz="900" dirty="0">
+                <a:solidFill>
+                  <a:srgbClr val="0070C0"/>
+                </a:solidFill>
+              </a:rPr>
+              <a:t>al/milk  c/healthy</a:t>
+            </a:r>
+            <a:r>
+              <a:rPr lang="en-US" sz="900" dirty="0">
+                <a:solidFill>
+                  <a:srgbClr val="0070C0"/>
+                </a:solidFill>
+              </a:rPr>
+              <a:t>”)</a:t>
             </a:r>
           </a:p>
         </p:txBody>
@@ -4085,13 +4198,15 @@
       <p:cxnSp>
         <p:nvCxnSpPr>
           <p:cNvPr id="28" name="Straight Arrow Connector 27"/>
-          <p:cNvCxnSpPr/>
+          <p:cNvCxnSpPr>
+            <a:cxnSpLocks/>
+          </p:cNvCxnSpPr>
           <p:nvPr/>
         </p:nvCxnSpPr>
         <p:spPr>
           <a:xfrm flipV="1">
-            <a:off x="5257218" y="3703214"/>
-            <a:ext cx="922392" cy="1"/>
+            <a:off x="3975245" y="3208184"/>
+            <a:ext cx="642532" cy="1"/>
           </a:xfrm>
           <a:prstGeom prst="straightConnector1">
             <a:avLst/>
@@ -4126,8 +4241,8 @@
         </p:nvSpPr>
         <p:spPr>
           <a:xfrm>
-            <a:off x="4257582" y="4251556"/>
-            <a:ext cx="855809" cy="215444"/>
+            <a:off x="2503041" y="3927579"/>
+            <a:ext cx="855809" cy="153888"/>
           </a:xfrm>
           <a:prstGeom prst="rect">
             <a:avLst/>
@@ -4152,7 +4267,7 @@
           </a:lstStyle>
           <a:p>
             <a:r>
-              <a:rPr lang="en-US" dirty="0"/>
+              <a:rPr lang="en-US" sz="1000" dirty="0"/>
               <a:t>execute()</a:t>
             </a:r>
           </a:p>
@@ -4161,13 +4276,16 @@
       <p:cxnSp>
         <p:nvCxnSpPr>
           <p:cNvPr id="34" name="Straight Arrow Connector 33"/>
-          <p:cNvCxnSpPr/>
+          <p:cNvCxnSpPr>
+            <a:cxnSpLocks/>
+            <a:endCxn id="21" idx="2"/>
+          </p:cNvCxnSpPr>
           <p:nvPr/>
         </p:nvCxnSpPr>
         <p:spPr>
           <a:xfrm>
-            <a:off x="5257800" y="4050281"/>
-            <a:ext cx="1492974" cy="0"/>
+            <a:off x="3953139" y="3463158"/>
+            <a:ext cx="1074397" cy="0"/>
           </a:xfrm>
           <a:prstGeom prst="straightConnector1">
             <a:avLst/>
@@ -4199,13 +4317,15 @@
       <p:cxnSp>
         <p:nvCxnSpPr>
           <p:cNvPr id="35" name="Straight Arrow Connector 34"/>
-          <p:cNvCxnSpPr/>
+          <p:cNvCxnSpPr>
+            <a:cxnSpLocks/>
+          </p:cNvCxnSpPr>
           <p:nvPr/>
         </p:nvCxnSpPr>
         <p:spPr>
-          <a:xfrm flipV="1">
-            <a:off x="1670186" y="4243231"/>
-            <a:ext cx="1596514" cy="5378"/>
+          <a:xfrm>
+            <a:off x="1144475" y="3785793"/>
+            <a:ext cx="1172249" cy="0"/>
           </a:xfrm>
           <a:prstGeom prst="straightConnector1">
             <a:avLst/>
@@ -4237,13 +4357,15 @@
       <p:cxnSp>
         <p:nvCxnSpPr>
           <p:cNvPr id="37" name="Straight Arrow Connector 36"/>
-          <p:cNvCxnSpPr/>
+          <p:cNvCxnSpPr>
+            <a:cxnSpLocks/>
+          </p:cNvCxnSpPr>
           <p:nvPr/>
         </p:nvCxnSpPr>
         <p:spPr>
           <a:xfrm>
-            <a:off x="304800" y="5791200"/>
-            <a:ext cx="1196051" cy="0"/>
+            <a:off x="69099" y="5238824"/>
+            <a:ext cx="1026270" cy="0"/>
           </a:xfrm>
           <a:prstGeom prst="straightConnector1">
             <a:avLst/>
@@ -4280,8 +4402,8 @@
         </p:nvSpPr>
         <p:spPr>
           <a:xfrm>
-            <a:off x="8265896" y="2362200"/>
-            <a:ext cx="1030504" cy="346760"/>
+            <a:off x="5924175" y="3095802"/>
+            <a:ext cx="802576" cy="238408"/>
           </a:xfrm>
           <a:prstGeom prst="rect">
             <a:avLst/>
@@ -4322,14 +4444,14 @@
           <a:p>
             <a:pPr algn="ctr"/>
             <a:r>
-              <a:rPr lang="en-US" sz="1600" dirty="0">
+              <a:rPr lang="en-US" sz="1200" dirty="0" err="1">
                 <a:solidFill>
                   <a:schemeClr val="bg1"/>
                 </a:solidFill>
               </a:rPr>
-              <a:t>:Model</a:t>
-            </a:r>
-            <a:endParaRPr lang="en-SG" sz="1600" dirty="0">
+              <a:t>q:Patient</a:t>
+            </a:r>
+            <a:endParaRPr lang="en-SG" sz="1200" dirty="0">
               <a:solidFill>
                 <a:schemeClr val="bg1"/>
               </a:solidFill>
@@ -4340,13 +4462,15 @@
       <p:cxnSp>
         <p:nvCxnSpPr>
           <p:cNvPr id="64" name="Straight Arrow Connector 63"/>
-          <p:cNvCxnSpPr/>
+          <p:cNvCxnSpPr>
+            <a:cxnSpLocks/>
+          </p:cNvCxnSpPr>
           <p:nvPr/>
         </p:nvCxnSpPr>
         <p:spPr>
           <a:xfrm>
-            <a:off x="1653251" y="4495317"/>
-            <a:ext cx="5043123" cy="0"/>
+            <a:off x="1177443" y="3918885"/>
+            <a:ext cx="3752367" cy="5992"/>
           </a:xfrm>
           <a:prstGeom prst="straightConnector1">
             <a:avLst/>
@@ -4381,8 +4505,8 @@
         </p:nvSpPr>
         <p:spPr>
           <a:xfrm>
-            <a:off x="6687452" y="4467000"/>
-            <a:ext cx="161322" cy="1019400"/>
+            <a:off x="4964344" y="3880176"/>
+            <a:ext cx="156393" cy="1247838"/>
           </a:xfrm>
           <a:prstGeom prst="rect">
             <a:avLst/>
@@ -4423,13 +4547,15 @@
       <p:cxnSp>
         <p:nvCxnSpPr>
           <p:cNvPr id="71" name="Straight Connector 70"/>
-          <p:cNvCxnSpPr/>
+          <p:cNvCxnSpPr>
+            <a:cxnSpLocks/>
+          </p:cNvCxnSpPr>
           <p:nvPr/>
         </p:nvCxnSpPr>
         <p:spPr>
-          <a:xfrm>
-            <a:off x="8781148" y="2700858"/>
-            <a:ext cx="0" cy="2830598"/>
+          <a:xfrm flipH="1">
+            <a:off x="7333818" y="2845589"/>
+            <a:ext cx="7494" cy="2358580"/>
           </a:xfrm>
           <a:prstGeom prst="line">
             <a:avLst/>
@@ -4468,8 +4594,8 @@
         </p:nvSpPr>
         <p:spPr>
           <a:xfrm>
-            <a:off x="8686800" y="4524597"/>
-            <a:ext cx="152400" cy="199803"/>
+            <a:off x="7253705" y="4272673"/>
+            <a:ext cx="160226" cy="272929"/>
           </a:xfrm>
           <a:prstGeom prst="rect">
             <a:avLst/>
@@ -4520,13 +4646,15 @@
       <p:cxnSp>
         <p:nvCxnSpPr>
           <p:cNvPr id="75" name="Straight Arrow Connector 74"/>
-          <p:cNvCxnSpPr/>
+          <p:cNvCxnSpPr>
+            <a:cxnSpLocks/>
+          </p:cNvCxnSpPr>
           <p:nvPr/>
         </p:nvCxnSpPr>
         <p:spPr>
           <a:xfrm>
-            <a:off x="6850663" y="4524597"/>
-            <a:ext cx="1836137" cy="0"/>
+            <a:off x="5148820" y="3927579"/>
+            <a:ext cx="1023380" cy="0"/>
           </a:xfrm>
           <a:prstGeom prst="straightConnector1">
             <a:avLst/>
@@ -4556,13 +4684,16 @@
       <p:cxnSp>
         <p:nvCxnSpPr>
           <p:cNvPr id="76" name="Straight Arrow Connector 75"/>
-          <p:cNvCxnSpPr/>
+          <p:cNvCxnSpPr>
+            <a:cxnSpLocks/>
+            <a:endCxn id="73" idx="2"/>
+          </p:cNvCxnSpPr>
           <p:nvPr/>
         </p:nvCxnSpPr>
         <p:spPr>
-          <a:xfrm flipV="1">
-            <a:off x="6848774" y="4714650"/>
-            <a:ext cx="1838026" cy="9750"/>
+          <a:xfrm>
+            <a:off x="5146095" y="4545602"/>
+            <a:ext cx="2187723" cy="0"/>
           </a:xfrm>
           <a:prstGeom prst="straightConnector1">
             <a:avLst/>
@@ -4597,13 +4728,15 @@
       <p:cxnSp>
         <p:nvCxnSpPr>
           <p:cNvPr id="77" name="Straight Arrow Connector 76"/>
-          <p:cNvCxnSpPr/>
+          <p:cNvCxnSpPr>
+            <a:cxnSpLocks/>
+          </p:cNvCxnSpPr>
           <p:nvPr/>
         </p:nvCxnSpPr>
         <p:spPr>
           <a:xfrm>
-            <a:off x="1653251" y="5486400"/>
-            <a:ext cx="5052349" cy="0"/>
+            <a:off x="1157660" y="5099949"/>
+            <a:ext cx="3817174" cy="0"/>
           </a:xfrm>
           <a:prstGeom prst="straightConnector1">
             <a:avLst/>
@@ -4634,14 +4767,14 @@
       </p:cxnSp>
       <p:sp>
         <p:nvSpPr>
-          <p:cNvPr id="78" name="TextBox 77"/>
+          <p:cNvPr id="79" name="TextBox 78"/>
           <p:cNvSpPr txBox="1"/>
           <p:nvPr/>
         </p:nvSpPr>
         <p:spPr>
           <a:xfrm>
-            <a:off x="6984957" y="4267200"/>
-            <a:ext cx="1424846" cy="215444"/>
+            <a:off x="2051894" y="3287391"/>
+            <a:ext cx="1773145" cy="138499"/>
           </a:xfrm>
           <a:prstGeom prst="rect">
             <a:avLst/>
@@ -4666,34 +4799,22 @@
           </a:lstStyle>
           <a:p>
             <a:r>
-              <a:rPr lang="en-US" dirty="0" err="1">
-                <a:solidFill>
-                  <a:srgbClr val="7030A0"/>
-                </a:solidFill>
-              </a:rPr>
-              <a:t>deletePerson</a:t>
-            </a:r>
-            <a:r>
-              <a:rPr lang="en-US" dirty="0">
-                <a:solidFill>
-                  <a:srgbClr val="7030A0"/>
-                </a:solidFill>
-              </a:rPr>
-              <a:t>(p)</a:t>
-            </a:r>
-          </a:p>
-        </p:txBody>
-      </p:sp>
-      <p:sp>
-        <p:nvSpPr>
-          <p:cNvPr id="79" name="TextBox 78"/>
+              <a:rPr lang="en-US" sz="900" dirty="0"/>
+              <a:t>parse(“1 al/milk  c/healthy”)</a:t>
+            </a:r>
+          </a:p>
+        </p:txBody>
+      </p:sp>
+      <p:sp>
+        <p:nvSpPr>
+          <p:cNvPr id="80" name="TextBox 79"/>
           <p:cNvSpPr txBox="1"/>
           <p:nvPr/>
         </p:nvSpPr>
         <p:spPr>
           <a:xfrm>
-            <a:off x="3847551" y="3657600"/>
-            <a:ext cx="767033" cy="184666"/>
+            <a:off x="604258" y="2687772"/>
+            <a:ext cx="1596780" cy="446276"/>
           </a:xfrm>
           <a:prstGeom prst="rect">
             <a:avLst/>
@@ -4718,22 +4839,50 @@
           </a:lstStyle>
           <a:p>
             <a:r>
-              <a:rPr lang="en-US" sz="1200" dirty="0"/>
-              <a:t>parse(“1”)</a:t>
-            </a:r>
-          </a:p>
-        </p:txBody>
-      </p:sp>
-      <p:sp>
-        <p:nvSpPr>
-          <p:cNvPr id="80" name="TextBox 79"/>
+              <a:rPr lang="en-US" sz="900" dirty="0"/>
+              <a:t>parse</a:t>
+            </a:r>
+          </a:p>
+          <a:p>
+            <a:r>
+              <a:rPr lang="en-US" sz="900" dirty="0"/>
+              <a:t>(“</a:t>
+            </a:r>
+            <a:r>
+              <a:rPr lang="en-US" altLang="zh-CN" sz="900" dirty="0"/>
+              <a:t>add-medical-history</a:t>
+            </a:r>
+          </a:p>
+          <a:p>
+            <a:r>
+              <a:rPr lang="en-US" altLang="zh-Hans" sz="900" dirty="0"/>
+              <a:t>1</a:t>
+            </a:r>
+            <a:r>
+              <a:rPr lang="zh-Hans" altLang="en-US" sz="900" dirty="0"/>
+              <a:t> </a:t>
+            </a:r>
+            <a:r>
+              <a:rPr lang="en-US" altLang="zh-Hans" sz="900" dirty="0"/>
+              <a:t>al/milk  c/healthy</a:t>
+            </a:r>
+            <a:r>
+              <a:rPr lang="en-US" sz="1100" dirty="0"/>
+              <a:t>”)</a:t>
+            </a:r>
+          </a:p>
+        </p:txBody>
+      </p:sp>
+      <p:sp>
+        <p:nvSpPr>
+          <p:cNvPr id="82" name="TextBox 81"/>
           <p:cNvSpPr txBox="1"/>
           <p:nvPr/>
         </p:nvSpPr>
         <p:spPr>
           <a:xfrm>
-            <a:off x="1742982" y="2850922"/>
-            <a:ext cx="1424846" cy="215444"/>
+            <a:off x="2654692" y="4906798"/>
+            <a:ext cx="621216" cy="153888"/>
           </a:xfrm>
           <a:prstGeom prst="rect">
             <a:avLst/>
@@ -4758,22 +4907,22 @@
           </a:lstStyle>
           <a:p>
             <a:r>
-              <a:rPr lang="en-US" dirty="0"/>
-              <a:t>parse(“delete 1”)</a:t>
-            </a:r>
-          </a:p>
-        </p:txBody>
-      </p:sp>
-      <p:sp>
-        <p:nvSpPr>
-          <p:cNvPr id="82" name="TextBox 81"/>
+              <a:rPr lang="en-US" sz="1000" dirty="0"/>
+              <a:t>result</a:t>
+            </a:r>
+          </a:p>
+        </p:txBody>
+      </p:sp>
+      <p:sp>
+        <p:nvSpPr>
+          <p:cNvPr id="83" name="TextBox 82"/>
           <p:cNvSpPr txBox="1"/>
           <p:nvPr/>
         </p:nvSpPr>
         <p:spPr>
           <a:xfrm>
-            <a:off x="4340137" y="5255323"/>
-            <a:ext cx="621216" cy="215444"/>
+            <a:off x="-87651" y="5065670"/>
+            <a:ext cx="762000" cy="138499"/>
           </a:xfrm>
           <a:prstGeom prst="rect">
             <a:avLst/>
@@ -4798,7 +4947,7 @@
           </a:lstStyle>
           <a:p>
             <a:r>
-              <a:rPr lang="en-US" dirty="0"/>
+              <a:rPr lang="en-US" sz="900" dirty="0"/>
               <a:t>result</a:t>
             </a:r>
           </a:p>
@@ -4806,14 +4955,99 @@
       </p:sp>
       <p:sp>
         <p:nvSpPr>
-          <p:cNvPr id="83" name="TextBox 82"/>
+          <p:cNvPr id="86" name="Rectangle 85"/>
+          <p:cNvSpPr/>
+          <p:nvPr/>
+        </p:nvSpPr>
+        <p:spPr>
+          <a:xfrm>
+            <a:off x="5948363" y="4956638"/>
+            <a:ext cx="152400" cy="171376"/>
+          </a:xfrm>
+          <a:prstGeom prst="rect">
+            <a:avLst/>
+          </a:prstGeom>
+          <a:solidFill>
+            <a:srgbClr val="0070C0"/>
+          </a:solidFill>
+          <a:ln>
+            <a:solidFill>
+              <a:srgbClr val="0070C0"/>
+            </a:solidFill>
+          </a:ln>
+          <a:effectLst/>
+        </p:spPr>
+        <p:style>
+          <a:lnRef idx="1">
+            <a:schemeClr val="accent3"/>
+          </a:lnRef>
+          <a:fillRef idx="2">
+            <a:schemeClr val="accent3"/>
+          </a:fillRef>
+          <a:effectRef idx="1">
+            <a:schemeClr val="accent3"/>
+          </a:effectRef>
+          <a:fontRef idx="minor">
+            <a:schemeClr val="dk1"/>
+          </a:fontRef>
+        </p:style>
+        <p:txBody>
+          <a:bodyPr rtlCol="0" anchor="ctr"/>
+          <a:lstStyle/>
+          <a:p>
+            <a:pPr algn="ctr"/>
+            <a:endParaRPr lang="en-SG" sz="1400"/>
+          </a:p>
+        </p:txBody>
+      </p:sp>
+      <p:cxnSp>
+        <p:nvCxnSpPr>
+          <p:cNvPr id="90" name="Straight Arrow Connector 89"/>
+          <p:cNvCxnSpPr/>
+          <p:nvPr/>
+        </p:nvCxnSpPr>
+        <p:spPr>
+          <a:xfrm>
+            <a:off x="5120737" y="5099949"/>
+            <a:ext cx="966624" cy="0"/>
+          </a:xfrm>
+          <a:prstGeom prst="straightConnector1">
+            <a:avLst/>
+          </a:prstGeom>
+          <a:ln w="19050">
+            <a:solidFill>
+              <a:srgbClr val="0070C0"/>
+            </a:solidFill>
+            <a:prstDash val="sysDash"/>
+            <a:headEnd type="arrow" w="med" len="med"/>
+            <a:tailEnd type="none" w="med" len="med"/>
+          </a:ln>
+        </p:spPr>
+        <p:style>
+          <a:lnRef idx="1">
+            <a:schemeClr val="accent1"/>
+          </a:lnRef>
+          <a:fillRef idx="0">
+            <a:schemeClr val="accent1"/>
+          </a:fillRef>
+          <a:effectRef idx="0">
+            <a:schemeClr val="accent1"/>
+          </a:effectRef>
+          <a:fontRef idx="minor">
+            <a:schemeClr val="tx1"/>
+          </a:fontRef>
+        </p:style>
+      </p:cxnSp>
+      <p:sp>
+        <p:nvSpPr>
+          <p:cNvPr id="93" name="TextBox 92"/>
           <p:cNvSpPr txBox="1"/>
           <p:nvPr/>
         </p:nvSpPr>
         <p:spPr>
           <a:xfrm>
-            <a:off x="599983" y="5538488"/>
-            <a:ext cx="762000" cy="215444"/>
+            <a:off x="1620659" y="3619497"/>
+            <a:ext cx="220343" cy="138499"/>
           </a:xfrm>
           <a:prstGeom prst="rect">
             <a:avLst/>
@@ -4838,22 +5072,22 @@
           </a:lstStyle>
           <a:p>
             <a:r>
-              <a:rPr lang="en-US" dirty="0"/>
-              <a:t>result</a:t>
-            </a:r>
-          </a:p>
-        </p:txBody>
-      </p:sp>
-      <p:sp>
-        <p:nvSpPr>
-          <p:cNvPr id="84" name="Rectangle 62"/>
+              <a:rPr lang="en-US" sz="900" dirty="0"/>
+              <a:t>d</a:t>
+            </a:r>
+          </a:p>
+        </p:txBody>
+      </p:sp>
+      <p:sp>
+        <p:nvSpPr>
+          <p:cNvPr id="40" name="Rectangle 62"/>
           <p:cNvSpPr/>
           <p:nvPr/>
         </p:nvSpPr>
         <p:spPr>
           <a:xfrm>
-            <a:off x="7020246" y="4777286"/>
-            <a:ext cx="1590354" cy="461538"/>
+            <a:off x="3183125" y="2486322"/>
+            <a:ext cx="1378279" cy="406397"/>
           </a:xfrm>
           <a:prstGeom prst="rect">
             <a:avLst/>
@@ -4888,39 +5122,91 @@
           <a:p>
             <a:pPr algn="ctr"/>
             <a:r>
-              <a:rPr lang="en-US" sz="1600" dirty="0" err="1">
+              <a:rPr lang="en-US" sz="1200" dirty="0">
                 <a:solidFill>
                   <a:schemeClr val="bg1"/>
                 </a:solidFill>
               </a:rPr>
-              <a:t>result:Command</a:t>
-            </a:r>
-            <a:r>
-              <a:rPr lang="en-US" sz="1600" dirty="0">
+              <a:t>:</a:t>
+            </a:r>
+            <a:r>
+              <a:rPr lang="en-US" sz="1200" dirty="0" err="1">
                 <a:solidFill>
                   <a:schemeClr val="bg1"/>
                 </a:solidFill>
               </a:rPr>
-              <a:t> Result</a:t>
-            </a:r>
-            <a:endParaRPr lang="en-SG" sz="1600" dirty="0">
+              <a:t>AddMedicalHistoy</a:t>
+            </a:r>
+            <a:endParaRPr lang="en-US" sz="1200" dirty="0">
               <a:solidFill>
                 <a:schemeClr val="bg1"/>
               </a:solidFill>
             </a:endParaRPr>
           </a:p>
-        </p:txBody>
-      </p:sp>
-      <p:sp>
-        <p:nvSpPr>
-          <p:cNvPr id="86" name="Rectangle 85"/>
+          <a:p>
+            <a:pPr algn="ctr"/>
+            <a:r>
+              <a:rPr lang="en-US" sz="1200" dirty="0" err="1">
+                <a:solidFill>
+                  <a:schemeClr val="bg1"/>
+                </a:solidFill>
+              </a:rPr>
+              <a:t>CommandParser</a:t>
+            </a:r>
+            <a:endParaRPr lang="en-SG" sz="1200" dirty="0">
+              <a:solidFill>
+                <a:schemeClr val="bg1"/>
+              </a:solidFill>
+            </a:endParaRPr>
+          </a:p>
+        </p:txBody>
+      </p:sp>
+      <p:cxnSp>
+        <p:nvCxnSpPr>
+          <p:cNvPr id="8" name="Straight Arrow Connector 7"/>
+          <p:cNvCxnSpPr>
+            <a:cxnSpLocks/>
+          </p:cNvCxnSpPr>
+          <p:nvPr/>
+        </p:nvCxnSpPr>
+        <p:spPr>
+          <a:xfrm>
+            <a:off x="2492115" y="3260080"/>
+            <a:ext cx="1314300" cy="0"/>
+          </a:xfrm>
+          <a:prstGeom prst="straightConnector1">
+            <a:avLst/>
+          </a:prstGeom>
+          <a:ln w="19050">
+            <a:headEnd type="none" w="med" len="med"/>
+            <a:tailEnd type="arrow" w="med" len="med"/>
+          </a:ln>
+        </p:spPr>
+        <p:style>
+          <a:lnRef idx="1">
+            <a:schemeClr val="accent1"/>
+          </a:lnRef>
+          <a:fillRef idx="0">
+            <a:schemeClr val="accent1"/>
+          </a:fillRef>
+          <a:effectRef idx="0">
+            <a:schemeClr val="accent1"/>
+          </a:effectRef>
+          <a:fontRef idx="minor">
+            <a:schemeClr val="tx1"/>
+          </a:fontRef>
+        </p:style>
+      </p:cxnSp>
+      <p:sp>
+        <p:nvSpPr>
+          <p:cNvPr id="45" name="Rectangle 44"/>
           <p:cNvSpPr/>
           <p:nvPr/>
         </p:nvSpPr>
         <p:spPr>
           <a:xfrm>
-            <a:off x="7777323" y="5238824"/>
-            <a:ext cx="152400" cy="171376"/>
+            <a:off x="3766621" y="2900291"/>
+            <a:ext cx="205843" cy="123165"/>
           </a:xfrm>
           <a:prstGeom prst="rect">
             <a:avLst/>
@@ -4954,20 +5240,108 @@
           <a:lstStyle/>
           <a:p>
             <a:pPr algn="ctr"/>
-            <a:endParaRPr lang="en-SG" sz="1400"/>
+            <a:endParaRPr lang="en-SG" sz="1400" dirty="0"/>
           </a:p>
         </p:txBody>
       </p:sp>
       <p:cxnSp>
         <p:nvCxnSpPr>
-          <p:cNvPr id="90" name="Straight Arrow Connector 89"/>
-          <p:cNvCxnSpPr/>
+          <p:cNvPr id="46" name="Straight Connector 45"/>
+          <p:cNvCxnSpPr>
+            <a:cxnSpLocks/>
+          </p:cNvCxnSpPr>
           <p:nvPr/>
         </p:nvCxnSpPr>
         <p:spPr>
-          <a:xfrm>
-            <a:off x="6858000" y="5410200"/>
-            <a:ext cx="966624" cy="0"/>
+          <a:xfrm flipH="1">
+            <a:off x="3865514" y="3037187"/>
+            <a:ext cx="15297" cy="748606"/>
+          </a:xfrm>
+          <a:prstGeom prst="line">
+            <a:avLst/>
+          </a:prstGeom>
+          <a:ln w="19050">
+            <a:solidFill>
+              <a:srgbClr val="0070C0"/>
+            </a:solidFill>
+            <a:prstDash val="sysDash"/>
+          </a:ln>
+          <a:effectLst/>
+        </p:spPr>
+        <p:style>
+          <a:lnRef idx="1">
+            <a:schemeClr val="accent1"/>
+          </a:lnRef>
+          <a:fillRef idx="2">
+            <a:schemeClr val="accent1"/>
+          </a:fillRef>
+          <a:effectRef idx="1">
+            <a:schemeClr val="accent1"/>
+          </a:effectRef>
+          <a:fontRef idx="minor">
+            <a:schemeClr val="dk1"/>
+          </a:fontRef>
+        </p:style>
+      </p:cxnSp>
+      <p:sp>
+        <p:nvSpPr>
+          <p:cNvPr id="49" name="Rectangle 48"/>
+          <p:cNvSpPr/>
+          <p:nvPr/>
+        </p:nvSpPr>
+        <p:spPr>
+          <a:xfrm>
+            <a:off x="3777890" y="3181973"/>
+            <a:ext cx="175249" cy="469929"/>
+          </a:xfrm>
+          <a:prstGeom prst="rect">
+            <a:avLst/>
+          </a:prstGeom>
+          <a:solidFill>
+            <a:srgbClr val="0070C0"/>
+          </a:solidFill>
+          <a:ln>
+            <a:solidFill>
+              <a:srgbClr val="0070C0"/>
+            </a:solidFill>
+          </a:ln>
+          <a:effectLst/>
+        </p:spPr>
+        <p:style>
+          <a:lnRef idx="1">
+            <a:schemeClr val="accent3"/>
+          </a:lnRef>
+          <a:fillRef idx="2">
+            <a:schemeClr val="accent3"/>
+          </a:fillRef>
+          <a:effectRef idx="1">
+            <a:schemeClr val="accent3"/>
+          </a:effectRef>
+          <a:fontRef idx="minor">
+            <a:schemeClr val="dk1"/>
+          </a:fontRef>
+        </p:style>
+        <p:txBody>
+          <a:bodyPr rtlCol="0" anchor="ctr"/>
+          <a:lstStyle/>
+          <a:p>
+            <a:pPr algn="ctr"/>
+            <a:endParaRPr lang="en-SG" sz="1400"/>
+          </a:p>
+        </p:txBody>
+      </p:sp>
+      <p:cxnSp>
+        <p:nvCxnSpPr>
+          <p:cNvPr id="51" name="Straight Arrow Connector 50"/>
+          <p:cNvCxnSpPr>
+            <a:cxnSpLocks/>
+          </p:cNvCxnSpPr>
+          <p:nvPr/>
+        </p:nvCxnSpPr>
+        <p:spPr>
+          <a:xfrm>
+            <a:off x="2488372" y="3632837"/>
+            <a:ext cx="1278249" cy="0"/>
           </a:xfrm>
           <a:prstGeom prst="straightConnector1">
             <a:avLst/>
@@ -4996,16 +5370,399 @@
           </a:fontRef>
         </p:style>
       </p:cxnSp>
-      <p:sp>
-        <p:nvSpPr>
-          <p:cNvPr id="93" name="TextBox 92"/>
+      <p:cxnSp>
+        <p:nvCxnSpPr>
+          <p:cNvPr id="13" name="Straight Arrow Connector 12"/>
+          <p:cNvCxnSpPr/>
+          <p:nvPr/>
+        </p:nvCxnSpPr>
+        <p:spPr>
+          <a:xfrm>
+            <a:off x="5154636" y="4739582"/>
+            <a:ext cx="162246" cy="0"/>
+          </a:xfrm>
+          <a:prstGeom prst="straightConnector1">
+            <a:avLst/>
+          </a:prstGeom>
+          <a:ln w="19050">
+            <a:headEnd type="none" w="med" len="med"/>
+            <a:tailEnd type="arrow" w="med" len="med"/>
+          </a:ln>
+        </p:spPr>
+        <p:style>
+          <a:lnRef idx="1">
+            <a:schemeClr val="accent1"/>
+          </a:lnRef>
+          <a:fillRef idx="0">
+            <a:schemeClr val="accent1"/>
+          </a:fillRef>
+          <a:effectRef idx="0">
+            <a:schemeClr val="accent1"/>
+          </a:effectRef>
+          <a:fontRef idx="minor">
+            <a:schemeClr val="tx1"/>
+          </a:fontRef>
+        </p:style>
+      </p:cxnSp>
+      <p:cxnSp>
+        <p:nvCxnSpPr>
+          <p:cNvPr id="50" name="Straight Arrow Connector 49"/>
+          <p:cNvCxnSpPr>
+            <a:cxnSpLocks/>
+          </p:cNvCxnSpPr>
+          <p:nvPr/>
+        </p:nvCxnSpPr>
+        <p:spPr>
+          <a:xfrm flipV="1">
+            <a:off x="2499663" y="2708960"/>
+            <a:ext cx="653044" cy="7406"/>
+          </a:xfrm>
+          <a:prstGeom prst="straightConnector1">
+            <a:avLst/>
+          </a:prstGeom>
+          <a:ln w="19050">
+            <a:solidFill>
+              <a:srgbClr val="0070C0"/>
+            </a:solidFill>
+            <a:tailEnd type="arrow"/>
+          </a:ln>
+        </p:spPr>
+        <p:style>
+          <a:lnRef idx="1">
+            <a:schemeClr val="accent1"/>
+          </a:lnRef>
+          <a:fillRef idx="0">
+            <a:schemeClr val="accent1"/>
+          </a:fillRef>
+          <a:effectRef idx="0">
+            <a:schemeClr val="accent1"/>
+          </a:effectRef>
+          <a:fontRef idx="minor">
+            <a:schemeClr val="tx1"/>
+          </a:fontRef>
+        </p:style>
+      </p:cxnSp>
+      <p:cxnSp>
+        <p:nvCxnSpPr>
+          <p:cNvPr id="52" name="Straight Arrow Connector 51"/>
+          <p:cNvCxnSpPr>
+            <a:cxnSpLocks/>
+          </p:cNvCxnSpPr>
+          <p:nvPr/>
+        </p:nvCxnSpPr>
+        <p:spPr>
+          <a:xfrm>
+            <a:off x="2468443" y="3024687"/>
+            <a:ext cx="1298178" cy="12500"/>
+          </a:xfrm>
+          <a:prstGeom prst="straightConnector1">
+            <a:avLst/>
+          </a:prstGeom>
+          <a:ln w="19050">
+            <a:solidFill>
+              <a:srgbClr val="0070C0"/>
+            </a:solidFill>
+            <a:prstDash val="sysDash"/>
+            <a:headEnd type="arrow" w="med" len="med"/>
+            <a:tailEnd type="none" w="med" len="med"/>
+          </a:ln>
+        </p:spPr>
+        <p:style>
+          <a:lnRef idx="1">
+            <a:schemeClr val="accent1"/>
+          </a:lnRef>
+          <a:fillRef idx="0">
+            <a:schemeClr val="accent1"/>
+          </a:fillRef>
+          <a:effectRef idx="0">
+            <a:schemeClr val="accent1"/>
+          </a:effectRef>
+          <a:fontRef idx="minor">
+            <a:schemeClr val="tx1"/>
+          </a:fontRef>
+        </p:style>
+      </p:cxnSp>
+      <p:sp>
+        <p:nvSpPr>
+          <p:cNvPr id="4" name="TextBox 3"/>
           <p:cNvSpPr txBox="1"/>
           <p:nvPr/>
         </p:nvSpPr>
         <p:spPr>
           <a:xfrm>
-            <a:off x="2673845" y="4027787"/>
-            <a:ext cx="220343" cy="215444"/>
+            <a:off x="3741553" y="3663267"/>
+            <a:ext cx="278515" cy="261610"/>
+          </a:xfrm>
+          <a:prstGeom prst="rect">
+            <a:avLst/>
+          </a:prstGeom>
+          <a:noFill/>
+        </p:spPr>
+        <p:txBody>
+          <a:bodyPr wrap="square" rtlCol="0">
+            <a:spAutoFit/>
+          </a:bodyPr>
+          <a:lstStyle/>
+          <a:p>
+            <a:r>
+              <a:rPr lang="en-SG" sz="1100" dirty="0">
+                <a:solidFill>
+                  <a:srgbClr val="002060"/>
+                </a:solidFill>
+              </a:rPr>
+              <a:t>X</a:t>
+            </a:r>
+          </a:p>
+        </p:txBody>
+      </p:sp>
+      <p:cxnSp>
+        <p:nvCxnSpPr>
+          <p:cNvPr id="74" name="Straight Connector 70">
+            <a:extLst>
+              <a:ext uri="{FF2B5EF4-FFF2-40B4-BE49-F238E27FC236}">
+                <a16:creationId xmlns:a16="http://schemas.microsoft.com/office/drawing/2014/main" id="{3C5E4B8D-C49A-FF4C-B2DF-24E2514AB45D}"/>
+              </a:ext>
+            </a:extLst>
+          </p:cNvPr>
+          <p:cNvCxnSpPr>
+            <a:cxnSpLocks/>
+          </p:cNvCxnSpPr>
+          <p:nvPr/>
+        </p:nvCxnSpPr>
+        <p:spPr>
+          <a:xfrm>
+            <a:off x="6286336" y="3334211"/>
+            <a:ext cx="0" cy="1635994"/>
+          </a:xfrm>
+          <a:prstGeom prst="line">
+            <a:avLst/>
+          </a:prstGeom>
+          <a:ln w="19050">
+            <a:solidFill>
+              <a:schemeClr val="accent4">
+                <a:lumMod val="60000"/>
+                <a:lumOff val="40000"/>
+              </a:schemeClr>
+            </a:solidFill>
+            <a:prstDash val="sysDash"/>
+          </a:ln>
+          <a:effectLst/>
+        </p:spPr>
+        <p:style>
+          <a:lnRef idx="1">
+            <a:schemeClr val="accent1"/>
+          </a:lnRef>
+          <a:fillRef idx="2">
+            <a:schemeClr val="accent1"/>
+          </a:fillRef>
+          <a:effectRef idx="1">
+            <a:schemeClr val="accent1"/>
+          </a:effectRef>
+          <a:fontRef idx="minor">
+            <a:schemeClr val="dk1"/>
+          </a:fontRef>
+        </p:style>
+      </p:cxnSp>
+      <p:sp>
+        <p:nvSpPr>
+          <p:cNvPr id="85" name="Rectangle 72">
+            <a:extLst>
+              <a:ext uri="{FF2B5EF4-FFF2-40B4-BE49-F238E27FC236}">
+                <a16:creationId xmlns:a16="http://schemas.microsoft.com/office/drawing/2014/main" id="{3A77499D-19EC-794E-A5C5-26EFCB5ED155}"/>
+              </a:ext>
+            </a:extLst>
+          </p:cNvPr>
+          <p:cNvSpPr/>
+          <p:nvPr/>
+        </p:nvSpPr>
+        <p:spPr>
+          <a:xfrm>
+            <a:off x="6179208" y="3887158"/>
+            <a:ext cx="163540" cy="303842"/>
+          </a:xfrm>
+          <a:prstGeom prst="rect">
+            <a:avLst/>
+          </a:prstGeom>
+          <a:solidFill>
+            <a:schemeClr val="accent4">
+              <a:lumMod val="60000"/>
+              <a:lumOff val="40000"/>
+            </a:schemeClr>
+          </a:solidFill>
+          <a:ln>
+            <a:solidFill>
+              <a:schemeClr val="accent4">
+                <a:lumMod val="60000"/>
+                <a:lumOff val="40000"/>
+              </a:schemeClr>
+            </a:solidFill>
+          </a:ln>
+          <a:effectLst/>
+        </p:spPr>
+        <p:style>
+          <a:lnRef idx="1">
+            <a:schemeClr val="accent3"/>
+          </a:lnRef>
+          <a:fillRef idx="2">
+            <a:schemeClr val="accent3"/>
+          </a:fillRef>
+          <a:effectRef idx="1">
+            <a:schemeClr val="accent3"/>
+          </a:effectRef>
+          <a:fontRef idx="minor">
+            <a:schemeClr val="dk1"/>
+          </a:fontRef>
+        </p:style>
+        <p:txBody>
+          <a:bodyPr rtlCol="0" anchor="ctr"/>
+          <a:lstStyle/>
+          <a:p>
+            <a:pPr algn="ctr"/>
+            <a:endParaRPr lang="en-SG" sz="1400">
+              <a:solidFill>
+                <a:schemeClr val="dk1"/>
+              </a:solidFill>
+            </a:endParaRPr>
+          </a:p>
+        </p:txBody>
+      </p:sp>
+      <p:cxnSp>
+        <p:nvCxnSpPr>
+          <p:cNvPr id="87" name="Straight Arrow Connector 75">
+            <a:extLst>
+              <a:ext uri="{FF2B5EF4-FFF2-40B4-BE49-F238E27FC236}">
+                <a16:creationId xmlns:a16="http://schemas.microsoft.com/office/drawing/2014/main" id="{7CF7ECA5-86DB-CF42-9365-87754163FDB3}"/>
+              </a:ext>
+            </a:extLst>
+          </p:cNvPr>
+          <p:cNvCxnSpPr>
+            <a:cxnSpLocks/>
+            <a:endCxn id="85" idx="2"/>
+          </p:cNvCxnSpPr>
+          <p:nvPr/>
+        </p:nvCxnSpPr>
+        <p:spPr>
+          <a:xfrm flipV="1">
+            <a:off x="5088152" y="4191000"/>
+            <a:ext cx="1172826" cy="11922"/>
+          </a:xfrm>
+          <a:prstGeom prst="straightConnector1">
+            <a:avLst/>
+          </a:prstGeom>
+          <a:ln w="19050">
+            <a:solidFill>
+              <a:schemeClr val="accent4">
+                <a:lumMod val="60000"/>
+                <a:lumOff val="40000"/>
+              </a:schemeClr>
+            </a:solidFill>
+            <a:prstDash val="sysDash"/>
+            <a:headEnd type="arrow" w="med" len="med"/>
+            <a:tailEnd type="none" w="med" len="med"/>
+          </a:ln>
+        </p:spPr>
+        <p:style>
+          <a:lnRef idx="1">
+            <a:schemeClr val="accent1"/>
+          </a:lnRef>
+          <a:fillRef idx="0">
+            <a:schemeClr val="accent1"/>
+          </a:fillRef>
+          <a:effectRef idx="0">
+            <a:schemeClr val="accent1"/>
+          </a:effectRef>
+          <a:fontRef idx="minor">
+            <a:schemeClr val="tx1"/>
+          </a:fontRef>
+        </p:style>
+      </p:cxnSp>
+      <p:sp>
+        <p:nvSpPr>
+          <p:cNvPr id="88" name="Rectangle 62">
+            <a:extLst>
+              <a:ext uri="{FF2B5EF4-FFF2-40B4-BE49-F238E27FC236}">
+                <a16:creationId xmlns:a16="http://schemas.microsoft.com/office/drawing/2014/main" id="{F7BA9BAF-B03F-A340-B807-FCD99F49A49E}"/>
+              </a:ext>
+            </a:extLst>
+          </p:cNvPr>
+          <p:cNvSpPr/>
+          <p:nvPr/>
+        </p:nvSpPr>
+        <p:spPr>
+          <a:xfrm>
+            <a:off x="7020246" y="2716366"/>
+            <a:ext cx="653648" cy="231455"/>
+          </a:xfrm>
+          <a:prstGeom prst="rect">
+            <a:avLst/>
+          </a:prstGeom>
+          <a:solidFill>
+            <a:schemeClr val="accent4">
+              <a:lumMod val="60000"/>
+              <a:lumOff val="40000"/>
+            </a:schemeClr>
+          </a:solidFill>
+          <a:ln w="19050">
+            <a:solidFill>
+              <a:schemeClr val="accent4">
+                <a:lumMod val="60000"/>
+                <a:lumOff val="40000"/>
+              </a:schemeClr>
+            </a:solidFill>
+          </a:ln>
+          <a:effectLst/>
+        </p:spPr>
+        <p:style>
+          <a:lnRef idx="1">
+            <a:schemeClr val="accent2"/>
+          </a:lnRef>
+          <a:fillRef idx="2">
+            <a:schemeClr val="accent2"/>
+          </a:fillRef>
+          <a:effectRef idx="1">
+            <a:schemeClr val="accent2"/>
+          </a:effectRef>
+          <a:fontRef idx="minor">
+            <a:schemeClr val="dk1"/>
+          </a:fontRef>
+        </p:style>
+        <p:txBody>
+          <a:bodyPr rtlCol="0" anchor="ctr"/>
+          <a:lstStyle/>
+          <a:p>
+            <a:pPr algn="ctr"/>
+            <a:r>
+              <a:rPr lang="en-US" sz="1200" dirty="0">
+                <a:solidFill>
+                  <a:schemeClr val="bg1"/>
+                </a:solidFill>
+              </a:rPr>
+              <a:t>:Model</a:t>
+            </a:r>
+            <a:endParaRPr lang="en-SG" sz="1200" dirty="0">
+              <a:solidFill>
+                <a:schemeClr val="bg1"/>
+              </a:solidFill>
+            </a:endParaRPr>
+          </a:p>
+        </p:txBody>
+      </p:sp>
+      <p:sp>
+        <p:nvSpPr>
+          <p:cNvPr id="89" name="TextBox 77">
+            <a:extLst>
+              <a:ext uri="{FF2B5EF4-FFF2-40B4-BE49-F238E27FC236}">
+                <a16:creationId xmlns:a16="http://schemas.microsoft.com/office/drawing/2014/main" id="{093278BE-0289-F347-B6D7-0B94514EC160}"/>
+              </a:ext>
+            </a:extLst>
+          </p:cNvPr>
+          <p:cNvSpPr txBox="1"/>
+          <p:nvPr/>
+        </p:nvSpPr>
+        <p:spPr>
+          <a:xfrm rot="10800000" flipV="1">
+            <a:off x="5235760" y="4183944"/>
+            <a:ext cx="540859" cy="153888"/>
           </a:xfrm>
           <a:prstGeom prst="rect">
             <a:avLst/>
@@ -5030,22 +5787,122 @@
           </a:lstStyle>
           <a:p>
             <a:r>
-              <a:rPr lang="en-US" dirty="0"/>
-              <a:t>d</a:t>
-            </a:r>
-          </a:p>
-        </p:txBody>
-      </p:sp>
-      <p:sp>
-        <p:nvSpPr>
-          <p:cNvPr id="40" name="Rectangle 62"/>
+              <a:rPr lang="en-US" sz="1000" dirty="0">
+                <a:solidFill>
+                  <a:srgbClr val="7030A0"/>
+                </a:solidFill>
+              </a:rPr>
+              <a:t>q</a:t>
+            </a:r>
+          </a:p>
+        </p:txBody>
+      </p:sp>
+      <p:cxnSp>
+        <p:nvCxnSpPr>
+          <p:cNvPr id="91" name="Straight Arrow Connector 74">
+            <a:extLst>
+              <a:ext uri="{FF2B5EF4-FFF2-40B4-BE49-F238E27FC236}">
+                <a16:creationId xmlns:a16="http://schemas.microsoft.com/office/drawing/2014/main" id="{C03ABABB-0272-4C4A-9E08-568D3C87CA72}"/>
+              </a:ext>
+            </a:extLst>
+          </p:cNvPr>
+          <p:cNvCxnSpPr>
+            <a:cxnSpLocks/>
+          </p:cNvCxnSpPr>
+          <p:nvPr/>
+        </p:nvCxnSpPr>
+        <p:spPr>
+          <a:xfrm>
+            <a:off x="5051485" y="4334846"/>
+            <a:ext cx="2202220" cy="2987"/>
+          </a:xfrm>
+          <a:prstGeom prst="straightConnector1">
+            <a:avLst/>
+          </a:prstGeom>
+          <a:ln w="19050">
+            <a:solidFill>
+              <a:srgbClr val="0070C0"/>
+            </a:solidFill>
+            <a:tailEnd type="arrow"/>
+          </a:ln>
+        </p:spPr>
+        <p:style>
+          <a:lnRef idx="1">
+            <a:schemeClr val="accent1"/>
+          </a:lnRef>
+          <a:fillRef idx="0">
+            <a:schemeClr val="accent1"/>
+          </a:fillRef>
+          <a:effectRef idx="0">
+            <a:schemeClr val="accent1"/>
+          </a:effectRef>
+          <a:fontRef idx="minor">
+            <a:schemeClr val="tx1"/>
+          </a:fontRef>
+        </p:style>
+      </p:cxnSp>
+      <p:sp>
+        <p:nvSpPr>
+          <p:cNvPr id="78" name="TextBox 77"/>
+          <p:cNvSpPr txBox="1"/>
+          <p:nvPr/>
+        </p:nvSpPr>
+        <p:spPr>
+          <a:xfrm>
+            <a:off x="5060096" y="4339566"/>
+            <a:ext cx="1424846" cy="138499"/>
+          </a:xfrm>
+          <a:prstGeom prst="rect">
+            <a:avLst/>
+          </a:prstGeom>
+          <a:noFill/>
+        </p:spPr>
+        <p:txBody>
+          <a:bodyPr wrap="square" lIns="0" tIns="0" rIns="0" bIns="0" rtlCol="0">
+            <a:spAutoFit/>
+          </a:bodyPr>
+          <a:lstStyle>
+            <a:defPPr>
+              <a:defRPr lang="en-US"/>
+            </a:defPPr>
+            <a:lvl1pPr algn="r">
+              <a:defRPr sz="1400">
+                <a:solidFill>
+                  <a:srgbClr val="0070C0"/>
+                </a:solidFill>
+              </a:defRPr>
+            </a:lvl1pPr>
+          </a:lstStyle>
+          <a:p>
+            <a:r>
+              <a:rPr lang="en-US" sz="900" dirty="0" err="1">
+                <a:solidFill>
+                  <a:srgbClr val="7030A0"/>
+                </a:solidFill>
+              </a:rPr>
+              <a:t>updatePerson</a:t>
+            </a:r>
+            <a:r>
+              <a:rPr lang="en-US" sz="900" dirty="0">
+                <a:solidFill>
+                  <a:srgbClr val="7030A0"/>
+                </a:solidFill>
+              </a:rPr>
+              <a:t>(p)</a:t>
+            </a:r>
+          </a:p>
+        </p:txBody>
+      </p:sp>
+      <p:sp>
+        <p:nvSpPr>
+          <p:cNvPr id="84" name="Rectangle 62"/>
           <p:cNvSpPr/>
           <p:nvPr/>
         </p:nvSpPr>
         <p:spPr>
           <a:xfrm>
-            <a:off x="4231981" y="2929839"/>
-            <a:ext cx="1778201" cy="432035"/>
+            <a:off x="5323187" y="4608294"/>
+            <a:ext cx="1244974" cy="331418"/>
           </a:xfrm>
           <a:prstGeom prst="rect">
             <a:avLst/>
@@ -5080,395 +5937,33 @@
           <a:p>
             <a:pPr algn="ctr"/>
             <a:r>
-              <a:rPr lang="en-US" sz="1600" dirty="0">
+              <a:rPr lang="en-US" sz="1200" dirty="0" err="1">
                 <a:solidFill>
                   <a:schemeClr val="bg1"/>
                 </a:solidFill>
               </a:rPr>
-              <a:t>:</a:t>
-            </a:r>
-            <a:r>
-              <a:rPr lang="en-US" sz="1600" dirty="0" err="1">
+              <a:t>result:Command</a:t>
+            </a:r>
+            <a:r>
+              <a:rPr lang="en-US" sz="1200" dirty="0">
                 <a:solidFill>
                   <a:schemeClr val="bg1"/>
                 </a:solidFill>
               </a:rPr>
-              <a:t>DeleteCommand</a:t>
-            </a:r>
-            <a:endParaRPr lang="en-US" sz="1600" dirty="0">
+              <a:t> Result</a:t>
+            </a:r>
+            <a:endParaRPr lang="en-SG" sz="1200" dirty="0">
               <a:solidFill>
                 <a:schemeClr val="bg1"/>
               </a:solidFill>
             </a:endParaRPr>
           </a:p>
-          <a:p>
-            <a:pPr algn="ctr"/>
-            <a:r>
-              <a:rPr lang="en-US" sz="1600" dirty="0">
-                <a:solidFill>
-                  <a:schemeClr val="bg1"/>
-                </a:solidFill>
-              </a:rPr>
-              <a:t>Parser</a:t>
-            </a:r>
-            <a:endParaRPr lang="en-SG" sz="1600" dirty="0">
-              <a:solidFill>
-                <a:schemeClr val="bg1"/>
-              </a:solidFill>
-            </a:endParaRPr>
-          </a:p>
-        </p:txBody>
-      </p:sp>
-      <p:cxnSp>
-        <p:nvCxnSpPr>
-          <p:cNvPr id="8" name="Straight Arrow Connector 7"/>
-          <p:cNvCxnSpPr/>
-          <p:nvPr/>
-        </p:nvCxnSpPr>
-        <p:spPr>
-          <a:xfrm>
-            <a:off x="3462591" y="3657600"/>
-            <a:ext cx="1597356" cy="1"/>
-          </a:xfrm>
-          <a:prstGeom prst="straightConnector1">
-            <a:avLst/>
-          </a:prstGeom>
-          <a:ln w="19050">
-            <a:headEnd type="none" w="med" len="med"/>
-            <a:tailEnd type="arrow" w="med" len="med"/>
-          </a:ln>
-        </p:spPr>
-        <p:style>
-          <a:lnRef idx="1">
-            <a:schemeClr val="accent1"/>
-          </a:lnRef>
-          <a:fillRef idx="0">
-            <a:schemeClr val="accent1"/>
-          </a:fillRef>
-          <a:effectRef idx="0">
-            <a:schemeClr val="accent1"/>
-          </a:effectRef>
-          <a:fontRef idx="minor">
-            <a:schemeClr val="tx1"/>
-          </a:fontRef>
-        </p:style>
-      </p:cxnSp>
-      <p:sp>
-        <p:nvSpPr>
-          <p:cNvPr id="45" name="Rectangle 44"/>
-          <p:cNvSpPr/>
-          <p:nvPr/>
-        </p:nvSpPr>
-        <p:spPr>
-          <a:xfrm>
-            <a:off x="5059947" y="3352800"/>
-            <a:ext cx="205843" cy="123165"/>
-          </a:xfrm>
-          <a:prstGeom prst="rect">
-            <a:avLst/>
-          </a:prstGeom>
-          <a:solidFill>
-            <a:srgbClr val="0070C0"/>
-          </a:solidFill>
-          <a:ln>
-            <a:solidFill>
-              <a:srgbClr val="0070C0"/>
-            </a:solidFill>
-          </a:ln>
-          <a:effectLst/>
-        </p:spPr>
-        <p:style>
-          <a:lnRef idx="1">
-            <a:schemeClr val="accent3"/>
-          </a:lnRef>
-          <a:fillRef idx="2">
-            <a:schemeClr val="accent3"/>
-          </a:fillRef>
-          <a:effectRef idx="1">
-            <a:schemeClr val="accent3"/>
-          </a:effectRef>
-          <a:fontRef idx="minor">
-            <a:schemeClr val="dk1"/>
-          </a:fontRef>
-        </p:style>
-        <p:txBody>
-          <a:bodyPr rtlCol="0" anchor="ctr"/>
-          <a:lstStyle/>
-          <a:p>
-            <a:pPr algn="ctr"/>
-            <a:endParaRPr lang="en-SG" sz="1400"/>
-          </a:p>
-        </p:txBody>
-      </p:sp>
-      <p:cxnSp>
-        <p:nvCxnSpPr>
-          <p:cNvPr id="46" name="Straight Connector 45"/>
-          <p:cNvCxnSpPr>
-            <a:stCxn id="45" idx="0"/>
-          </p:cNvCxnSpPr>
-          <p:nvPr/>
-        </p:nvCxnSpPr>
-        <p:spPr>
-          <a:xfrm>
-            <a:off x="5162869" y="3352800"/>
-            <a:ext cx="0" cy="990600"/>
-          </a:xfrm>
-          <a:prstGeom prst="line">
-            <a:avLst/>
-          </a:prstGeom>
-          <a:ln w="19050">
-            <a:solidFill>
-              <a:srgbClr val="0070C0"/>
-            </a:solidFill>
-            <a:prstDash val="sysDash"/>
-          </a:ln>
-          <a:effectLst/>
-        </p:spPr>
-        <p:style>
-          <a:lnRef idx="1">
-            <a:schemeClr val="accent1"/>
-          </a:lnRef>
-          <a:fillRef idx="2">
-            <a:schemeClr val="accent1"/>
-          </a:fillRef>
-          <a:effectRef idx="1">
-            <a:schemeClr val="accent1"/>
-          </a:effectRef>
-          <a:fontRef idx="minor">
-            <a:schemeClr val="dk1"/>
-          </a:fontRef>
-        </p:style>
-      </p:cxnSp>
-      <p:sp>
-        <p:nvSpPr>
-          <p:cNvPr id="49" name="Rectangle 48"/>
-          <p:cNvSpPr/>
-          <p:nvPr/>
-        </p:nvSpPr>
-        <p:spPr>
-          <a:xfrm>
-            <a:off x="5059947" y="3657601"/>
-            <a:ext cx="205843" cy="533400"/>
-          </a:xfrm>
-          <a:prstGeom prst="rect">
-            <a:avLst/>
-          </a:prstGeom>
-          <a:solidFill>
-            <a:srgbClr val="0070C0"/>
-          </a:solidFill>
-          <a:ln>
-            <a:solidFill>
-              <a:srgbClr val="0070C0"/>
-            </a:solidFill>
-          </a:ln>
-          <a:effectLst/>
-        </p:spPr>
-        <p:style>
-          <a:lnRef idx="1">
-            <a:schemeClr val="accent3"/>
-          </a:lnRef>
-          <a:fillRef idx="2">
-            <a:schemeClr val="accent3"/>
-          </a:fillRef>
-          <a:effectRef idx="1">
-            <a:schemeClr val="accent3"/>
-          </a:effectRef>
-          <a:fontRef idx="minor">
-            <a:schemeClr val="dk1"/>
-          </a:fontRef>
-        </p:style>
-        <p:txBody>
-          <a:bodyPr rtlCol="0" anchor="ctr"/>
-          <a:lstStyle/>
-          <a:p>
-            <a:pPr algn="ctr"/>
-            <a:endParaRPr lang="en-SG" sz="1400"/>
-          </a:p>
-        </p:txBody>
-      </p:sp>
-      <p:cxnSp>
-        <p:nvCxnSpPr>
-          <p:cNvPr id="51" name="Straight Arrow Connector 50"/>
-          <p:cNvCxnSpPr/>
-          <p:nvPr/>
-        </p:nvCxnSpPr>
-        <p:spPr>
-          <a:xfrm>
-            <a:off x="3499382" y="4185073"/>
-            <a:ext cx="1667219" cy="0"/>
-          </a:xfrm>
-          <a:prstGeom prst="straightConnector1">
-            <a:avLst/>
-          </a:prstGeom>
-          <a:ln w="19050">
-            <a:solidFill>
-              <a:srgbClr val="0070C0"/>
-            </a:solidFill>
-            <a:prstDash val="sysDash"/>
-            <a:headEnd type="arrow" w="med" len="med"/>
-            <a:tailEnd type="none" w="med" len="med"/>
-          </a:ln>
-        </p:spPr>
-        <p:style>
-          <a:lnRef idx="1">
-            <a:schemeClr val="accent1"/>
-          </a:lnRef>
-          <a:fillRef idx="0">
-            <a:schemeClr val="accent1"/>
-          </a:fillRef>
-          <a:effectRef idx="0">
-            <a:schemeClr val="accent1"/>
-          </a:effectRef>
-          <a:fontRef idx="minor">
-            <a:schemeClr val="tx1"/>
-          </a:fontRef>
-        </p:style>
-      </p:cxnSp>
-      <p:cxnSp>
-        <p:nvCxnSpPr>
-          <p:cNvPr id="13" name="Straight Arrow Connector 12"/>
-          <p:cNvCxnSpPr/>
-          <p:nvPr/>
-        </p:nvCxnSpPr>
-        <p:spPr>
-          <a:xfrm>
-            <a:off x="6858000" y="5029200"/>
-            <a:ext cx="162246" cy="0"/>
-          </a:xfrm>
-          <a:prstGeom prst="straightConnector1">
-            <a:avLst/>
-          </a:prstGeom>
-          <a:ln w="19050">
-            <a:headEnd type="none" w="med" len="med"/>
-            <a:tailEnd type="arrow" w="med" len="med"/>
-          </a:ln>
-        </p:spPr>
-        <p:style>
-          <a:lnRef idx="1">
-            <a:schemeClr val="accent1"/>
-          </a:lnRef>
-          <a:fillRef idx="0">
-            <a:schemeClr val="accent1"/>
-          </a:fillRef>
-          <a:effectRef idx="0">
-            <a:schemeClr val="accent1"/>
-          </a:effectRef>
-          <a:fontRef idx="minor">
-            <a:schemeClr val="tx1"/>
-          </a:fontRef>
-        </p:style>
-      </p:cxnSp>
-      <p:cxnSp>
-        <p:nvCxnSpPr>
-          <p:cNvPr id="50" name="Straight Arrow Connector 49"/>
-          <p:cNvCxnSpPr/>
-          <p:nvPr/>
-        </p:nvCxnSpPr>
-        <p:spPr>
-          <a:xfrm>
-            <a:off x="3412425" y="3173004"/>
-            <a:ext cx="819556" cy="1"/>
-          </a:xfrm>
-          <a:prstGeom prst="straightConnector1">
-            <a:avLst/>
-          </a:prstGeom>
-          <a:ln w="19050">
-            <a:solidFill>
-              <a:srgbClr val="0070C0"/>
-            </a:solidFill>
-            <a:tailEnd type="arrow"/>
-          </a:ln>
-        </p:spPr>
-        <p:style>
-          <a:lnRef idx="1">
-            <a:schemeClr val="accent1"/>
-          </a:lnRef>
-          <a:fillRef idx="0">
-            <a:schemeClr val="accent1"/>
-          </a:fillRef>
-          <a:effectRef idx="0">
-            <a:schemeClr val="accent1"/>
-          </a:effectRef>
-          <a:fontRef idx="minor">
-            <a:schemeClr val="tx1"/>
-          </a:fontRef>
-        </p:style>
-      </p:cxnSp>
-      <p:cxnSp>
-        <p:nvCxnSpPr>
-          <p:cNvPr id="52" name="Straight Arrow Connector 51"/>
-          <p:cNvCxnSpPr/>
-          <p:nvPr/>
-        </p:nvCxnSpPr>
-        <p:spPr>
-          <a:xfrm>
-            <a:off x="3459519" y="3475965"/>
-            <a:ext cx="1600428" cy="0"/>
-          </a:xfrm>
-          <a:prstGeom prst="straightConnector1">
-            <a:avLst/>
-          </a:prstGeom>
-          <a:ln w="19050">
-            <a:solidFill>
-              <a:srgbClr val="0070C0"/>
-            </a:solidFill>
-            <a:prstDash val="sysDash"/>
-            <a:headEnd type="arrow" w="med" len="med"/>
-            <a:tailEnd type="none" w="med" len="med"/>
-          </a:ln>
-        </p:spPr>
-        <p:style>
-          <a:lnRef idx="1">
-            <a:schemeClr val="accent1"/>
-          </a:lnRef>
-          <a:fillRef idx="0">
-            <a:schemeClr val="accent1"/>
-          </a:fillRef>
-          <a:effectRef idx="0">
-            <a:schemeClr val="accent1"/>
-          </a:effectRef>
-          <a:fontRef idx="minor">
-            <a:schemeClr val="tx1"/>
-          </a:fontRef>
-        </p:style>
-      </p:cxnSp>
-      <p:sp>
-        <p:nvSpPr>
-          <p:cNvPr id="4" name="TextBox 3"/>
-          <p:cNvSpPr txBox="1"/>
-          <p:nvPr/>
-        </p:nvSpPr>
-        <p:spPr>
-          <a:xfrm>
-            <a:off x="5033665" y="4199590"/>
-            <a:ext cx="258404" cy="261610"/>
-          </a:xfrm>
-          <a:prstGeom prst="rect">
-            <a:avLst/>
-          </a:prstGeom>
-          <a:noFill/>
-        </p:spPr>
-        <p:txBody>
-          <a:bodyPr wrap="none" rtlCol="0">
-            <a:spAutoFit/>
-          </a:bodyPr>
-          <a:lstStyle/>
-          <a:p>
-            <a:r>
-              <a:rPr lang="en-SG" sz="1100" dirty="0">
-                <a:solidFill>
-                  <a:srgbClr val="002060"/>
-                </a:solidFill>
-              </a:rPr>
-              <a:t>X</a:t>
-            </a:r>
-          </a:p>
         </p:txBody>
       </p:sp>
     </p:spTree>
     <p:extLst>
       <p:ext uri="{BB962C8B-B14F-4D97-AF65-F5344CB8AC3E}">
-        <p14:creationId xmlns:p14="http://schemas.microsoft.com/office/powerpoint/2010/main" val="3945898909"/>
+        <p14:creationId xmlns:p14="http://schemas.microsoft.com/office/powerpoint/2010/main" val="2876103528"/>
       </p:ext>
     </p:extLst>
   </p:cSld>

</xml_diff>

<commit_message>
docs/diagrams/LogicComponentSequenceDiagram.pptx & docs/images/DeleteEventSdForLogic.png: - Update class :AddressBookParser to :SchedulerParser - Update method deletePerson(p) to deleteEvent(e)
docs/images: Replace DeletePersonSdForLogic.png
with deleteEventSdForLogic.png

docs/diagrams/ModelComponentSequenceDiagram.pptx &
docs/images/ModelClassDiagram.png:
- Update interface ReadOnlyAddressBook to
  ReadOnlyScheduler
- Rename class UserPref to UserPrefs
- Update class AddressBook to Scheduler
- Update class VersionedAddressBook to
  VersionedScheduler
- Removed interface ObservableList
- Removed class UniqueEventList
- Update class Person to Event
- Update attributes of Person class to attributes
  of Event class

docs/DeveloperGuide.adoc (line 203): Replace
DeletePersonSdForLogic.png with
DeleteEventSdForLogic.png
</commit_message>
<xml_diff>
--- a/docs/diagrams/LogicComponentSequenceDiagram.pptx
+++ b/docs/diagrams/LogicComponentSequenceDiagram.pptx
@@ -126,10 +126,6 @@
 </p:presentation>
 </file>
 
-<file path=ppt/revisionInfo.xml><?xml version="1.0" encoding="utf-8"?>
-<p1510:revInfo xmlns:a="http://schemas.openxmlformats.org/drawingml/2006/main" xmlns:r="http://schemas.openxmlformats.org/officeDocument/2006/relationships" xmlns:p1510="http://schemas.microsoft.com/office/powerpoint/2015/10/main"/>
-</file>
-
 <file path=ppt/notesMasters/notesMaster1.xml><?xml version="1.0" encoding="utf-8"?>
 <p:notesMaster xmlns:a="http://schemas.openxmlformats.org/drawingml/2006/main" xmlns:r="http://schemas.openxmlformats.org/officeDocument/2006/relationships" xmlns:p="http://schemas.openxmlformats.org/presentationml/2006/main">
   <p:cSld>
@@ -212,7 +208,7 @@
           <a:p>
             <a:fld id="{F5CC4B3F-88C1-4FFA-B1B6-F41C21DC6924}" type="datetimeFigureOut">
               <a:rPr lang="en-US" smtClean="0"/>
-              <a:t>7/11/2017</a:t>
+              <a:t>10/25/2018</a:t>
             </a:fld>
             <a:endParaRPr lang="en-US"/>
           </a:p>
@@ -658,7 +654,7 @@
           <a:p>
             <a:fld id="{78C97017-6FC3-485B-9764-EAC9E56C1D49}" type="datetimeFigureOut">
               <a:rPr lang="en-US" smtClean="0"/>
-              <a:t>7/11/2017</a:t>
+              <a:t>10/25/2018</a:t>
             </a:fld>
             <a:endParaRPr lang="en-US"/>
           </a:p>
@@ -826,7 +822,7 @@
           <a:p>
             <a:fld id="{78C97017-6FC3-485B-9764-EAC9E56C1D49}" type="datetimeFigureOut">
               <a:rPr lang="en-US" smtClean="0"/>
-              <a:t>7/11/2017</a:t>
+              <a:t>10/25/2018</a:t>
             </a:fld>
             <a:endParaRPr lang="en-US"/>
           </a:p>
@@ -1004,7 +1000,7 @@
           <a:p>
             <a:fld id="{78C97017-6FC3-485B-9764-EAC9E56C1D49}" type="datetimeFigureOut">
               <a:rPr lang="en-US" smtClean="0"/>
-              <a:t>7/11/2017</a:t>
+              <a:t>10/25/2018</a:t>
             </a:fld>
             <a:endParaRPr lang="en-US"/>
           </a:p>
@@ -1172,7 +1168,7 @@
           <a:p>
             <a:fld id="{78C97017-6FC3-485B-9764-EAC9E56C1D49}" type="datetimeFigureOut">
               <a:rPr lang="en-US" smtClean="0"/>
-              <a:t>7/11/2017</a:t>
+              <a:t>10/25/2018</a:t>
             </a:fld>
             <a:endParaRPr lang="en-US"/>
           </a:p>
@@ -1417,7 +1413,7 @@
           <a:p>
             <a:fld id="{78C97017-6FC3-485B-9764-EAC9E56C1D49}" type="datetimeFigureOut">
               <a:rPr lang="en-US" smtClean="0"/>
-              <a:t>7/11/2017</a:t>
+              <a:t>10/25/2018</a:t>
             </a:fld>
             <a:endParaRPr lang="en-US"/>
           </a:p>
@@ -1702,7 +1698,7 @@
           <a:p>
             <a:fld id="{78C97017-6FC3-485B-9764-EAC9E56C1D49}" type="datetimeFigureOut">
               <a:rPr lang="en-US" smtClean="0"/>
-              <a:t>7/11/2017</a:t>
+              <a:t>10/25/2018</a:t>
             </a:fld>
             <a:endParaRPr lang="en-US"/>
           </a:p>
@@ -2121,7 +2117,7 @@
           <a:p>
             <a:fld id="{78C97017-6FC3-485B-9764-EAC9E56C1D49}" type="datetimeFigureOut">
               <a:rPr lang="en-US" smtClean="0"/>
-              <a:t>7/11/2017</a:t>
+              <a:t>10/25/2018</a:t>
             </a:fld>
             <a:endParaRPr lang="en-US"/>
           </a:p>
@@ -2238,7 +2234,7 @@
           <a:p>
             <a:fld id="{78C97017-6FC3-485B-9764-EAC9E56C1D49}" type="datetimeFigureOut">
               <a:rPr lang="en-US" smtClean="0"/>
-              <a:t>7/11/2017</a:t>
+              <a:t>10/25/2018</a:t>
             </a:fld>
             <a:endParaRPr lang="en-US"/>
           </a:p>
@@ -2333,7 +2329,7 @@
           <a:p>
             <a:fld id="{78C97017-6FC3-485B-9764-EAC9E56C1D49}" type="datetimeFigureOut">
               <a:rPr lang="en-US" smtClean="0"/>
-              <a:t>7/11/2017</a:t>
+              <a:t>10/25/2018</a:t>
             </a:fld>
             <a:endParaRPr lang="en-US"/>
           </a:p>
@@ -2608,7 +2604,7 @@
           <a:p>
             <a:fld id="{78C97017-6FC3-485B-9764-EAC9E56C1D49}" type="datetimeFigureOut">
               <a:rPr lang="en-US" smtClean="0"/>
-              <a:t>7/11/2017</a:t>
+              <a:t>10/25/2018</a:t>
             </a:fld>
             <a:endParaRPr lang="en-US"/>
           </a:p>
@@ -2860,7 +2856,7 @@
           <a:p>
             <a:fld id="{78C97017-6FC3-485B-9764-EAC9E56C1D49}" type="datetimeFigureOut">
               <a:rPr lang="en-US" smtClean="0"/>
-              <a:t>7/11/2017</a:t>
+              <a:t>10/25/2018</a:t>
             </a:fld>
             <a:endParaRPr lang="en-US"/>
           </a:p>
@@ -3071,7 +3067,7 @@
           <a:p>
             <a:fld id="{78C97017-6FC3-485B-9764-EAC9E56C1D49}" type="datetimeFigureOut">
               <a:rPr lang="en-US" smtClean="0"/>
-              <a:t>7/11/2017</a:t>
+              <a:t>10/25/2018</a:t>
             </a:fld>
             <a:endParaRPr lang="en-US"/>
           </a:p>
@@ -3707,18 +3703,15 @@
                   <a:schemeClr val="bg1"/>
                 </a:solidFill>
               </a:rPr>
-              <a:t>:Address</a:t>
-            </a:r>
-          </a:p>
-          <a:p>
-            <a:pPr algn="ctr"/>
+              <a:t>:</a:t>
+            </a:r>
             <a:r>
               <a:rPr lang="en-US" sz="1600" dirty="0" err="1">
                 <a:solidFill>
                   <a:schemeClr val="bg1"/>
                 </a:solidFill>
               </a:rPr>
-              <a:t>BookParser</a:t>
+              <a:t>SchedulerParser</a:t>
             </a:r>
             <a:endParaRPr lang="en-SG" sz="1600" dirty="0">
               <a:solidFill>
@@ -4671,7 +4664,7 @@
                   <a:srgbClr val="7030A0"/>
                 </a:solidFill>
               </a:rPr>
-              <a:t>deletePerson</a:t>
+              <a:t>deleteEvent</a:t>
             </a:r>
             <a:r>
               <a:rPr lang="en-US" dirty="0">
@@ -4679,7 +4672,7 @@
                   <a:srgbClr val="7030A0"/>
                 </a:solidFill>
               </a:rPr>
-              <a:t>(p)</a:t>
+              <a:t>(e)</a:t>
             </a:r>
           </a:p>
         </p:txBody>

</xml_diff>

<commit_message>
Update developerDocs - Update the logicComponentSequenceDiagram.png - Update the logicComponentSequenceDiagram.pptx - Correct the playlist del command occurences
</commit_message>
<xml_diff>
--- a/docs/diagrams/LogicComponentSequenceDiagram.pptx
+++ b/docs/diagrams/LogicComponentSequenceDiagram.pptx
@@ -126,10 +126,6 @@
 </p:presentation>
 </file>
 
-<file path=ppt/revisionInfo.xml><?xml version="1.0" encoding="utf-8"?>
-<p1510:revInfo xmlns:a="http://schemas.openxmlformats.org/drawingml/2006/main" xmlns:r="http://schemas.openxmlformats.org/officeDocument/2006/relationships" xmlns:p1510="http://schemas.microsoft.com/office/powerpoint/2015/10/main"/>
-</file>
-
 <file path=ppt/notesMasters/notesMaster1.xml><?xml version="1.0" encoding="utf-8"?>
 <p:notesMaster xmlns:a="http://schemas.openxmlformats.org/drawingml/2006/main" xmlns:r="http://schemas.openxmlformats.org/officeDocument/2006/relationships" xmlns:p="http://schemas.openxmlformats.org/presentationml/2006/main">
   <p:cSld>
@@ -212,7 +208,7 @@
           <a:p>
             <a:fld id="{F5CC4B3F-88C1-4FFA-B1B6-F41C21DC6924}" type="datetimeFigureOut">
               <a:rPr lang="en-US" smtClean="0"/>
-              <a:t>7/11/2017</a:t>
+              <a:t>11/10/2018</a:t>
             </a:fld>
             <a:endParaRPr lang="en-US"/>
           </a:p>
@@ -658,7 +654,7 @@
           <a:p>
             <a:fld id="{78C97017-6FC3-485B-9764-EAC9E56C1D49}" type="datetimeFigureOut">
               <a:rPr lang="en-US" smtClean="0"/>
-              <a:t>7/11/2017</a:t>
+              <a:t>11/10/2018</a:t>
             </a:fld>
             <a:endParaRPr lang="en-US"/>
           </a:p>
@@ -826,7 +822,7 @@
           <a:p>
             <a:fld id="{78C97017-6FC3-485B-9764-EAC9E56C1D49}" type="datetimeFigureOut">
               <a:rPr lang="en-US" smtClean="0"/>
-              <a:t>7/11/2017</a:t>
+              <a:t>11/10/2018</a:t>
             </a:fld>
             <a:endParaRPr lang="en-US"/>
           </a:p>
@@ -1004,7 +1000,7 @@
           <a:p>
             <a:fld id="{78C97017-6FC3-485B-9764-EAC9E56C1D49}" type="datetimeFigureOut">
               <a:rPr lang="en-US" smtClean="0"/>
-              <a:t>7/11/2017</a:t>
+              <a:t>11/10/2018</a:t>
             </a:fld>
             <a:endParaRPr lang="en-US"/>
           </a:p>
@@ -1172,7 +1168,7 @@
           <a:p>
             <a:fld id="{78C97017-6FC3-485B-9764-EAC9E56C1D49}" type="datetimeFigureOut">
               <a:rPr lang="en-US" smtClean="0"/>
-              <a:t>7/11/2017</a:t>
+              <a:t>11/10/2018</a:t>
             </a:fld>
             <a:endParaRPr lang="en-US"/>
           </a:p>
@@ -1417,7 +1413,7 @@
           <a:p>
             <a:fld id="{78C97017-6FC3-485B-9764-EAC9E56C1D49}" type="datetimeFigureOut">
               <a:rPr lang="en-US" smtClean="0"/>
-              <a:t>7/11/2017</a:t>
+              <a:t>11/10/2018</a:t>
             </a:fld>
             <a:endParaRPr lang="en-US"/>
           </a:p>
@@ -1702,7 +1698,7 @@
           <a:p>
             <a:fld id="{78C97017-6FC3-485B-9764-EAC9E56C1D49}" type="datetimeFigureOut">
               <a:rPr lang="en-US" smtClean="0"/>
-              <a:t>7/11/2017</a:t>
+              <a:t>11/10/2018</a:t>
             </a:fld>
             <a:endParaRPr lang="en-US"/>
           </a:p>
@@ -2121,7 +2117,7 @@
           <a:p>
             <a:fld id="{78C97017-6FC3-485B-9764-EAC9E56C1D49}" type="datetimeFigureOut">
               <a:rPr lang="en-US" smtClean="0"/>
-              <a:t>7/11/2017</a:t>
+              <a:t>11/10/2018</a:t>
             </a:fld>
             <a:endParaRPr lang="en-US"/>
           </a:p>
@@ -2238,7 +2234,7 @@
           <a:p>
             <a:fld id="{78C97017-6FC3-485B-9764-EAC9E56C1D49}" type="datetimeFigureOut">
               <a:rPr lang="en-US" smtClean="0"/>
-              <a:t>7/11/2017</a:t>
+              <a:t>11/10/2018</a:t>
             </a:fld>
             <a:endParaRPr lang="en-US"/>
           </a:p>
@@ -2333,7 +2329,7 @@
           <a:p>
             <a:fld id="{78C97017-6FC3-485B-9764-EAC9E56C1D49}" type="datetimeFigureOut">
               <a:rPr lang="en-US" smtClean="0"/>
-              <a:t>7/11/2017</a:t>
+              <a:t>11/10/2018</a:t>
             </a:fld>
             <a:endParaRPr lang="en-US"/>
           </a:p>
@@ -2608,7 +2604,7 @@
           <a:p>
             <a:fld id="{78C97017-6FC3-485B-9764-EAC9E56C1D49}" type="datetimeFigureOut">
               <a:rPr lang="en-US" smtClean="0"/>
-              <a:t>7/11/2017</a:t>
+              <a:t>11/10/2018</a:t>
             </a:fld>
             <a:endParaRPr lang="en-US"/>
           </a:p>
@@ -2860,7 +2856,7 @@
           <a:p>
             <a:fld id="{78C97017-6FC3-485B-9764-EAC9E56C1D49}" type="datetimeFigureOut">
               <a:rPr lang="en-US" smtClean="0"/>
-              <a:t>7/11/2017</a:t>
+              <a:t>11/10/2018</a:t>
             </a:fld>
             <a:endParaRPr lang="en-US"/>
           </a:p>
@@ -3071,7 +3067,7 @@
           <a:p>
             <a:fld id="{78C97017-6FC3-485B-9764-EAC9E56C1D49}" type="datetimeFigureOut">
               <a:rPr lang="en-US" smtClean="0"/>
-              <a:t>7/11/2017</a:t>
+              <a:t>11/10/2018</a:t>
             </a:fld>
             <a:endParaRPr lang="en-US"/>
           </a:p>
@@ -3707,18 +3703,18 @@
                   <a:schemeClr val="bg1"/>
                 </a:solidFill>
               </a:rPr>
-              <a:t>:Address</a:t>
+              <a:t>:Library</a:t>
             </a:r>
           </a:p>
           <a:p>
             <a:pPr algn="ctr"/>
             <a:r>
-              <a:rPr lang="en-US" sz="1600" dirty="0" err="1">
+              <a:rPr lang="en-US" sz="1600" dirty="0">
                 <a:solidFill>
                   <a:schemeClr val="bg1"/>
                 </a:solidFill>
               </a:rPr>
-              <a:t>BookParser</a:t>
+              <a:t>Parser</a:t>
             </a:r>
             <a:endParaRPr lang="en-SG" sz="1600" dirty="0">
               <a:solidFill>
@@ -3731,13 +3727,16 @@
       <p:cxnSp>
         <p:nvCxnSpPr>
           <p:cNvPr id="17" name="Straight Connector 16"/>
-          <p:cNvCxnSpPr/>
+          <p:cNvCxnSpPr>
+            <a:cxnSpLocks/>
+            <a:endCxn id="18" idx="2"/>
+          </p:cNvCxnSpPr>
           <p:nvPr/>
         </p:nvCxnSpPr>
         <p:spPr>
           <a:xfrm>
             <a:off x="3356599" y="2663904"/>
-            <a:ext cx="0" cy="1695374"/>
+            <a:ext cx="15456" cy="1587651"/>
           </a:xfrm>
           <a:prstGeom prst="line">
             <a:avLst/>
@@ -3824,8 +3823,8 @@
         </p:nvSpPr>
         <p:spPr>
           <a:xfrm>
-            <a:off x="6221565" y="3312740"/>
-            <a:ext cx="1093635" cy="461538"/>
+            <a:off x="6221565" y="3173004"/>
+            <a:ext cx="1349175" cy="601274"/>
           </a:xfrm>
           <a:prstGeom prst="rect">
             <a:avLst/>
@@ -3865,7 +3864,7 @@
                   <a:schemeClr val="bg1"/>
                 </a:solidFill>
               </a:rPr>
-              <a:t>d:Delete</a:t>
+              <a:t>d:playlistDel</a:t>
             </a:r>
             <a:br>
               <a:rPr lang="en-US" sz="1600" dirty="0">
@@ -4056,8 +4055,8 @@
         </p:nvSpPr>
         <p:spPr>
           <a:xfrm>
-            <a:off x="0" y="2743200"/>
-            <a:ext cx="1424846" cy="215444"/>
+            <a:off x="60917" y="2795467"/>
+            <a:ext cx="1372023" cy="430887"/>
           </a:xfrm>
           <a:prstGeom prst="rect">
             <a:avLst/>
@@ -4070,14 +4069,25 @@
           </a:bodyPr>
           <a:lstStyle/>
           <a:p>
-            <a:pPr algn="r"/>
+            <a:pPr algn="ctr"/>
             <a:r>
               <a:rPr lang="en-US" sz="1400" dirty="0">
                 <a:solidFill>
                   <a:srgbClr val="0070C0"/>
                 </a:solidFill>
               </a:rPr>
-              <a:t>execute(“delete 1”)</a:t>
+              <a:t>execute(</a:t>
+            </a:r>
+          </a:p>
+          <a:p>
+            <a:pPr algn="ctr"/>
+            <a:r>
+              <a:rPr lang="en-US" sz="1400" dirty="0">
+                <a:solidFill>
+                  <a:srgbClr val="0070C0"/>
+                </a:solidFill>
+              </a:rPr>
+              <a:t>“playlist del 1”)</a:t>
             </a:r>
           </a:p>
         </p:txBody>
@@ -4671,7 +4681,7 @@
                   <a:srgbClr val="7030A0"/>
                 </a:solidFill>
               </a:rPr>
-              <a:t>deletePerson</a:t>
+              <a:t>deletePlaylist</a:t>
             </a:r>
             <a:r>
               <a:rPr lang="en-US" dirty="0">
@@ -4732,8 +4742,8 @@
         </p:nvSpPr>
         <p:spPr>
           <a:xfrm>
-            <a:off x="1742982" y="2850922"/>
-            <a:ext cx="1424846" cy="215444"/>
+            <a:off x="1758146" y="2865103"/>
+            <a:ext cx="1558002" cy="215444"/>
           </a:xfrm>
           <a:prstGeom prst="rect">
             <a:avLst/>
@@ -4759,7 +4769,7 @@
           <a:p>
             <a:r>
               <a:rPr lang="en-US" dirty="0"/>
-              <a:t>parse(“delete 1”)</a:t>
+              <a:t>parse(“playlist del 1”)</a:t>
             </a:r>
           </a:p>
         </p:txBody>
@@ -5044,8 +5054,8 @@
         </p:nvSpPr>
         <p:spPr>
           <a:xfrm>
-            <a:off x="4231981" y="2929839"/>
-            <a:ext cx="1778201" cy="432035"/>
+            <a:off x="4231981" y="2660217"/>
+            <a:ext cx="1778201" cy="701657"/>
           </a:xfrm>
           <a:prstGeom prst="rect">
             <a:avLst/>
@@ -5093,7 +5103,7 @@
                   <a:schemeClr val="bg1"/>
                 </a:solidFill>
               </a:rPr>
-              <a:t>DeleteCommand</a:t>
+              <a:t>playlistDel</a:t>
             </a:r>
             <a:endParaRPr lang="en-US" sz="1600" dirty="0">
               <a:solidFill>
@@ -5104,12 +5114,12 @@
           <a:p>
             <a:pPr algn="ctr"/>
             <a:r>
-              <a:rPr lang="en-US" sz="1600" dirty="0">
+              <a:rPr lang="en-US" sz="1600" dirty="0" err="1">
                 <a:solidFill>
                   <a:schemeClr val="bg1"/>
                 </a:solidFill>
               </a:rPr>
-              <a:t>Parser</a:t>
+              <a:t>CommandParser</a:t>
             </a:r>
             <a:endParaRPr lang="en-SG" sz="1600" dirty="0">
               <a:solidFill>

</xml_diff>

<commit_message>
docs/: Fix remaining diagrams and images
</commit_message>
<xml_diff>
--- a/docs/diagrams/LogicComponentSequenceDiagram.pptx
+++ b/docs/diagrams/LogicComponentSequenceDiagram.pptx
@@ -208,7 +208,7 @@
           <a:p>
             <a:fld id="{F5CC4B3F-88C1-4FFA-B1B6-F41C21DC6924}" type="datetimeFigureOut">
               <a:rPr lang="en-US" smtClean="0"/>
-              <a:t>10/25/2018</a:t>
+              <a:t>11/12/2018</a:t>
             </a:fld>
             <a:endParaRPr lang="en-US"/>
           </a:p>
@@ -654,7 +654,7 @@
           <a:p>
             <a:fld id="{78C97017-6FC3-485B-9764-EAC9E56C1D49}" type="datetimeFigureOut">
               <a:rPr lang="en-US" smtClean="0"/>
-              <a:t>10/25/2018</a:t>
+              <a:t>11/12/2018</a:t>
             </a:fld>
             <a:endParaRPr lang="en-US"/>
           </a:p>
@@ -822,7 +822,7 @@
           <a:p>
             <a:fld id="{78C97017-6FC3-485B-9764-EAC9E56C1D49}" type="datetimeFigureOut">
               <a:rPr lang="en-US" smtClean="0"/>
-              <a:t>10/25/2018</a:t>
+              <a:t>11/12/2018</a:t>
             </a:fld>
             <a:endParaRPr lang="en-US"/>
           </a:p>
@@ -1000,7 +1000,7 @@
           <a:p>
             <a:fld id="{78C97017-6FC3-485B-9764-EAC9E56C1D49}" type="datetimeFigureOut">
               <a:rPr lang="en-US" smtClean="0"/>
-              <a:t>10/25/2018</a:t>
+              <a:t>11/12/2018</a:t>
             </a:fld>
             <a:endParaRPr lang="en-US"/>
           </a:p>
@@ -1168,7 +1168,7 @@
           <a:p>
             <a:fld id="{78C97017-6FC3-485B-9764-EAC9E56C1D49}" type="datetimeFigureOut">
               <a:rPr lang="en-US" smtClean="0"/>
-              <a:t>10/25/2018</a:t>
+              <a:t>11/12/2018</a:t>
             </a:fld>
             <a:endParaRPr lang="en-US"/>
           </a:p>
@@ -1413,7 +1413,7 @@
           <a:p>
             <a:fld id="{78C97017-6FC3-485B-9764-EAC9E56C1D49}" type="datetimeFigureOut">
               <a:rPr lang="en-US" smtClean="0"/>
-              <a:t>10/25/2018</a:t>
+              <a:t>11/12/2018</a:t>
             </a:fld>
             <a:endParaRPr lang="en-US"/>
           </a:p>
@@ -1698,7 +1698,7 @@
           <a:p>
             <a:fld id="{78C97017-6FC3-485B-9764-EAC9E56C1D49}" type="datetimeFigureOut">
               <a:rPr lang="en-US" smtClean="0"/>
-              <a:t>10/25/2018</a:t>
+              <a:t>11/12/2018</a:t>
             </a:fld>
             <a:endParaRPr lang="en-US"/>
           </a:p>
@@ -2117,7 +2117,7 @@
           <a:p>
             <a:fld id="{78C97017-6FC3-485B-9764-EAC9E56C1D49}" type="datetimeFigureOut">
               <a:rPr lang="en-US" smtClean="0"/>
-              <a:t>10/25/2018</a:t>
+              <a:t>11/12/2018</a:t>
             </a:fld>
             <a:endParaRPr lang="en-US"/>
           </a:p>
@@ -2234,7 +2234,7 @@
           <a:p>
             <a:fld id="{78C97017-6FC3-485B-9764-EAC9E56C1D49}" type="datetimeFigureOut">
               <a:rPr lang="en-US" smtClean="0"/>
-              <a:t>10/25/2018</a:t>
+              <a:t>11/12/2018</a:t>
             </a:fld>
             <a:endParaRPr lang="en-US"/>
           </a:p>
@@ -2329,7 +2329,7 @@
           <a:p>
             <a:fld id="{78C97017-6FC3-485B-9764-EAC9E56C1D49}" type="datetimeFigureOut">
               <a:rPr lang="en-US" smtClean="0"/>
-              <a:t>10/25/2018</a:t>
+              <a:t>11/12/2018</a:t>
             </a:fld>
             <a:endParaRPr lang="en-US"/>
           </a:p>
@@ -2604,7 +2604,7 @@
           <a:p>
             <a:fld id="{78C97017-6FC3-485B-9764-EAC9E56C1D49}" type="datetimeFigureOut">
               <a:rPr lang="en-US" smtClean="0"/>
-              <a:t>10/25/2018</a:t>
+              <a:t>11/12/2018</a:t>
             </a:fld>
             <a:endParaRPr lang="en-US"/>
           </a:p>
@@ -2856,7 +2856,7 @@
           <a:p>
             <a:fld id="{78C97017-6FC3-485B-9764-EAC9E56C1D49}" type="datetimeFigureOut">
               <a:rPr lang="en-US" smtClean="0"/>
-              <a:t>10/25/2018</a:t>
+              <a:t>11/12/2018</a:t>
             </a:fld>
             <a:endParaRPr lang="en-US"/>
           </a:p>
@@ -3067,7 +3067,7 @@
           <a:p>
             <a:fld id="{78C97017-6FC3-485B-9764-EAC9E56C1D49}" type="datetimeFigureOut">
               <a:rPr lang="en-US" smtClean="0"/>
-              <a:t>10/25/2018</a:t>
+              <a:t>11/12/2018</a:t>
             </a:fld>
             <a:endParaRPr lang="en-US"/>
           </a:p>
@@ -3703,15 +3703,22 @@
                   <a:schemeClr val="bg1"/>
                 </a:solidFill>
               </a:rPr>
-              <a:t>:</a:t>
-            </a:r>
-            <a:r>
-              <a:rPr lang="en-US" sz="1600" dirty="0" err="1">
+              <a:t>:Scheduler</a:t>
+            </a:r>
+            <a:br>
+              <a:rPr lang="en-US" sz="1600" dirty="0">
                 <a:solidFill>
                   <a:schemeClr val="bg1"/>
                 </a:solidFill>
               </a:rPr>
-              <a:t>SchedulerParser</a:t>
+            </a:br>
+            <a:r>
+              <a:rPr lang="en-US" sz="1600" dirty="0">
+                <a:solidFill>
+                  <a:schemeClr val="bg1"/>
+                </a:solidFill>
+              </a:rPr>
+              <a:t>Parser</a:t>
             </a:r>
             <a:endParaRPr lang="en-SG" sz="1600" dirty="0">
               <a:solidFill>

</xml_diff>